<commit_message>
🎨 Update Federated Learning section in example.html
</commit_message>
<xml_diff>
--- a/AnimationM1.pptx
+++ b/AnimationM1.pptx
@@ -10,13 +10,14 @@
     <p:sldId id="258" r:id="rId4"/>
     <p:sldId id="259" r:id="rId5"/>
     <p:sldId id="260" r:id="rId6"/>
-    <p:sldId id="261" r:id="rId7"/>
-    <p:sldId id="268" r:id="rId8"/>
+    <p:sldId id="268" r:id="rId7"/>
+    <p:sldId id="261" r:id="rId8"/>
     <p:sldId id="263" r:id="rId9"/>
     <p:sldId id="266" r:id="rId10"/>
     <p:sldId id="264" r:id="rId11"/>
     <p:sldId id="265" r:id="rId12"/>
     <p:sldId id="267" r:id="rId13"/>
+    <p:sldId id="269" r:id="rId14"/>
   </p:sldIdLst>
   <p:sldSz cx="12192000" cy="6858000"/>
   <p:notesSz cx="6858000" cy="9144000"/>
@@ -270,7 +271,7 @@
           <a:p>
             <a:fld id="{7229CB6B-CC19-4A04-B763-1EB028D84416}" type="datetimeFigureOut">
               <a:rPr lang="fr-FR" smtClean="0"/>
-              <a:t>08/04/2024</a:t>
+              <a:t>09/04/2024</a:t>
             </a:fld>
             <a:endParaRPr lang="fr-FR"/>
           </a:p>
@@ -468,7 +469,7 @@
           <a:p>
             <a:fld id="{7229CB6B-CC19-4A04-B763-1EB028D84416}" type="datetimeFigureOut">
               <a:rPr lang="fr-FR" smtClean="0"/>
-              <a:t>08/04/2024</a:t>
+              <a:t>09/04/2024</a:t>
             </a:fld>
             <a:endParaRPr lang="fr-FR"/>
           </a:p>
@@ -676,7 +677,7 @@
           <a:p>
             <a:fld id="{7229CB6B-CC19-4A04-B763-1EB028D84416}" type="datetimeFigureOut">
               <a:rPr lang="fr-FR" smtClean="0"/>
-              <a:t>08/04/2024</a:t>
+              <a:t>09/04/2024</a:t>
             </a:fld>
             <a:endParaRPr lang="fr-FR"/>
           </a:p>
@@ -874,7 +875,7 @@
           <a:p>
             <a:fld id="{7229CB6B-CC19-4A04-B763-1EB028D84416}" type="datetimeFigureOut">
               <a:rPr lang="fr-FR" smtClean="0"/>
-              <a:t>08/04/2024</a:t>
+              <a:t>09/04/2024</a:t>
             </a:fld>
             <a:endParaRPr lang="fr-FR"/>
           </a:p>
@@ -1149,7 +1150,7 @@
           <a:p>
             <a:fld id="{7229CB6B-CC19-4A04-B763-1EB028D84416}" type="datetimeFigureOut">
               <a:rPr lang="fr-FR" smtClean="0"/>
-              <a:t>08/04/2024</a:t>
+              <a:t>09/04/2024</a:t>
             </a:fld>
             <a:endParaRPr lang="fr-FR"/>
           </a:p>
@@ -1414,7 +1415,7 @@
           <a:p>
             <a:fld id="{7229CB6B-CC19-4A04-B763-1EB028D84416}" type="datetimeFigureOut">
               <a:rPr lang="fr-FR" smtClean="0"/>
-              <a:t>08/04/2024</a:t>
+              <a:t>09/04/2024</a:t>
             </a:fld>
             <a:endParaRPr lang="fr-FR"/>
           </a:p>
@@ -1826,7 +1827,7 @@
           <a:p>
             <a:fld id="{7229CB6B-CC19-4A04-B763-1EB028D84416}" type="datetimeFigureOut">
               <a:rPr lang="fr-FR" smtClean="0"/>
-              <a:t>08/04/2024</a:t>
+              <a:t>09/04/2024</a:t>
             </a:fld>
             <a:endParaRPr lang="fr-FR"/>
           </a:p>
@@ -1967,7 +1968,7 @@
           <a:p>
             <a:fld id="{7229CB6B-CC19-4A04-B763-1EB028D84416}" type="datetimeFigureOut">
               <a:rPr lang="fr-FR" smtClean="0"/>
-              <a:t>08/04/2024</a:t>
+              <a:t>09/04/2024</a:t>
             </a:fld>
             <a:endParaRPr lang="fr-FR"/>
           </a:p>
@@ -2080,7 +2081,7 @@
           <a:p>
             <a:fld id="{7229CB6B-CC19-4A04-B763-1EB028D84416}" type="datetimeFigureOut">
               <a:rPr lang="fr-FR" smtClean="0"/>
-              <a:t>08/04/2024</a:t>
+              <a:t>09/04/2024</a:t>
             </a:fld>
             <a:endParaRPr lang="fr-FR"/>
           </a:p>
@@ -2391,7 +2392,7 @@
           <a:p>
             <a:fld id="{7229CB6B-CC19-4A04-B763-1EB028D84416}" type="datetimeFigureOut">
               <a:rPr lang="fr-FR" smtClean="0"/>
-              <a:t>08/04/2024</a:t>
+              <a:t>09/04/2024</a:t>
             </a:fld>
             <a:endParaRPr lang="fr-FR"/>
           </a:p>
@@ -2679,7 +2680,7 @@
           <a:p>
             <a:fld id="{7229CB6B-CC19-4A04-B763-1EB028D84416}" type="datetimeFigureOut">
               <a:rPr lang="fr-FR" smtClean="0"/>
-              <a:t>08/04/2024</a:t>
+              <a:t>09/04/2024</a:t>
             </a:fld>
             <a:endParaRPr lang="fr-FR"/>
           </a:p>
@@ -2923,7 +2924,7 @@
           <a:p>
             <a:fld id="{7229CB6B-CC19-4A04-B763-1EB028D84416}" type="datetimeFigureOut">
               <a:rPr lang="fr-FR" smtClean="0"/>
-              <a:t>08/04/2024</a:t>
+              <a:t>09/04/2024</a:t>
             </a:fld>
             <a:endParaRPr lang="fr-FR"/>
           </a:p>
@@ -6366,6 +6367,144 @@
           </a:p>
         </p:txBody>
       </p:sp>
+      <p:sp>
+        <p:nvSpPr>
+          <p:cNvPr id="14" name="Rectangle 13">
+            <a:extLst>
+              <a:ext uri="{FF2B5EF4-FFF2-40B4-BE49-F238E27FC236}">
+                <a16:creationId xmlns:a16="http://schemas.microsoft.com/office/drawing/2014/main" id="{BD01691A-0DCD-8219-A57E-3E8EB7916BA3}"/>
+              </a:ext>
+            </a:extLst>
+          </p:cNvPr>
+          <p:cNvSpPr/>
+          <p:nvPr/>
+        </p:nvSpPr>
+        <p:spPr>
+          <a:xfrm>
+            <a:off x="6621949" y="2451389"/>
+            <a:ext cx="211452" cy="187587"/>
+          </a:xfrm>
+          <a:prstGeom prst="rect">
+            <a:avLst/>
+          </a:prstGeom>
+        </p:spPr>
+        <p:style>
+          <a:lnRef idx="2">
+            <a:schemeClr val="accent4">
+              <a:shade val="15000"/>
+            </a:schemeClr>
+          </a:lnRef>
+          <a:fillRef idx="1">
+            <a:schemeClr val="accent4"/>
+          </a:fillRef>
+          <a:effectRef idx="0">
+            <a:schemeClr val="accent4"/>
+          </a:effectRef>
+          <a:fontRef idx="minor">
+            <a:schemeClr val="lt1"/>
+          </a:fontRef>
+        </p:style>
+        <p:txBody>
+          <a:bodyPr rtlCol="0" anchor="ctr"/>
+          <a:lstStyle/>
+          <a:p>
+            <a:pPr algn="ctr"/>
+            <a:endParaRPr lang="fr-FR"/>
+          </a:p>
+        </p:txBody>
+      </p:sp>
+      <p:sp>
+        <p:nvSpPr>
+          <p:cNvPr id="15" name="Rectangle 14">
+            <a:extLst>
+              <a:ext uri="{FF2B5EF4-FFF2-40B4-BE49-F238E27FC236}">
+                <a16:creationId xmlns:a16="http://schemas.microsoft.com/office/drawing/2014/main" id="{991C98DC-BA9A-32C7-EC64-BE8734A011E4}"/>
+              </a:ext>
+            </a:extLst>
+          </p:cNvPr>
+          <p:cNvSpPr/>
+          <p:nvPr/>
+        </p:nvSpPr>
+        <p:spPr>
+          <a:xfrm>
+            <a:off x="6621949" y="2718945"/>
+            <a:ext cx="211452" cy="187587"/>
+          </a:xfrm>
+          <a:prstGeom prst="rect">
+            <a:avLst/>
+          </a:prstGeom>
+        </p:spPr>
+        <p:style>
+          <a:lnRef idx="2">
+            <a:schemeClr val="accent2">
+              <a:shade val="15000"/>
+            </a:schemeClr>
+          </a:lnRef>
+          <a:fillRef idx="1">
+            <a:schemeClr val="accent2"/>
+          </a:fillRef>
+          <a:effectRef idx="0">
+            <a:schemeClr val="accent2"/>
+          </a:effectRef>
+          <a:fontRef idx="minor">
+            <a:schemeClr val="lt1"/>
+          </a:fontRef>
+        </p:style>
+        <p:txBody>
+          <a:bodyPr rtlCol="0" anchor="ctr"/>
+          <a:lstStyle/>
+          <a:p>
+            <a:pPr algn="ctr"/>
+            <a:endParaRPr lang="fr-FR"/>
+          </a:p>
+        </p:txBody>
+      </p:sp>
+      <p:sp>
+        <p:nvSpPr>
+          <p:cNvPr id="16" name="Rectangle 15">
+            <a:extLst>
+              <a:ext uri="{FF2B5EF4-FFF2-40B4-BE49-F238E27FC236}">
+                <a16:creationId xmlns:a16="http://schemas.microsoft.com/office/drawing/2014/main" id="{791B6052-DEEC-AE85-61F9-0211BAB693A9}"/>
+              </a:ext>
+            </a:extLst>
+          </p:cNvPr>
+          <p:cNvSpPr/>
+          <p:nvPr/>
+        </p:nvSpPr>
+        <p:spPr>
+          <a:xfrm>
+            <a:off x="6621949" y="2183833"/>
+            <a:ext cx="217537" cy="187587"/>
+          </a:xfrm>
+          <a:prstGeom prst="rect">
+            <a:avLst/>
+          </a:prstGeom>
+        </p:spPr>
+        <p:style>
+          <a:lnRef idx="2">
+            <a:schemeClr val="accent6">
+              <a:shade val="15000"/>
+            </a:schemeClr>
+          </a:lnRef>
+          <a:fillRef idx="1">
+            <a:schemeClr val="accent6"/>
+          </a:fillRef>
+          <a:effectRef idx="0">
+            <a:schemeClr val="accent6"/>
+          </a:effectRef>
+          <a:fontRef idx="minor">
+            <a:schemeClr val="lt1"/>
+          </a:fontRef>
+        </p:style>
+        <p:txBody>
+          <a:bodyPr rtlCol="0" anchor="ctr"/>
+          <a:lstStyle/>
+          <a:p>
+            <a:pPr algn="ctr"/>
+            <a:endParaRPr lang="fr-FR"/>
+          </a:p>
+        </p:txBody>
+      </p:sp>
     </p:spTree>
     <p:extLst>
       <p:ext uri="{BB962C8B-B14F-4D97-AF65-F5344CB8AC3E}">
@@ -7604,6 +7743,1105 @@
   <p:clrMapOvr>
     <a:masterClrMapping/>
   </p:clrMapOvr>
+  <mc:AlternateContent xmlns:mc="http://schemas.openxmlformats.org/markup-compatibility/2006" xmlns:p14="http://schemas.microsoft.com/office/powerpoint/2010/main">
+    <mc:Choice Requires="p14">
+      <p:transition spd="med" p14:dur="700" advClick="0" advTm="7000">
+        <p:fade/>
+      </p:transition>
+    </mc:Choice>
+    <mc:Fallback xmlns="">
+      <p:transition spd="med" advClick="0" advTm="7000">
+        <p:fade/>
+      </p:transition>
+    </mc:Fallback>
+  </mc:AlternateContent>
+</p:sld>
+</file>
+
+<file path=ppt/slides/slide13.xml><?xml version="1.0" encoding="utf-8"?>
+<p:sld xmlns:a="http://schemas.openxmlformats.org/drawingml/2006/main" xmlns:r="http://schemas.openxmlformats.org/officeDocument/2006/relationships" xmlns:p="http://schemas.openxmlformats.org/presentationml/2006/main" show="0">
+  <p:cSld>
+    <p:spTree>
+      <p:nvGrpSpPr>
+        <p:cNvPr id="1" name=""/>
+        <p:cNvGrpSpPr/>
+        <p:nvPr/>
+      </p:nvGrpSpPr>
+      <p:grpSpPr>
+        <a:xfrm>
+          <a:off x="0" y="0"/>
+          <a:ext cx="0" cy="0"/>
+          <a:chOff x="0" y="0"/>
+          <a:chExt cx="0" cy="0"/>
+        </a:xfrm>
+      </p:grpSpPr>
+      <p:pic>
+        <p:nvPicPr>
+          <p:cNvPr id="1034" name="Picture 10" descr="Ordinateur personnel - Icônes la technologie gratuites">
+            <a:extLst>
+              <a:ext uri="{FF2B5EF4-FFF2-40B4-BE49-F238E27FC236}">
+                <a16:creationId xmlns:a16="http://schemas.microsoft.com/office/drawing/2014/main" id="{52AE620C-A39B-DCD6-1F03-A2EF850DC413}"/>
+              </a:ext>
+            </a:extLst>
+          </p:cNvPr>
+          <p:cNvPicPr>
+            <a:picLocks noChangeAspect="1" noChangeArrowheads="1"/>
+          </p:cNvPicPr>
+          <p:nvPr/>
+        </p:nvPicPr>
+        <p:blipFill>
+          <a:blip r:embed="rId2">
+            <a:extLst>
+              <a:ext uri="{28A0092B-C50C-407E-A947-70E740481C1C}">
+                <a14:useLocalDpi xmlns:a14="http://schemas.microsoft.com/office/drawing/2010/main" val="0"/>
+              </a:ext>
+            </a:extLst>
+          </a:blip>
+          <a:srcRect/>
+          <a:stretch>
+            <a:fillRect/>
+          </a:stretch>
+        </p:blipFill>
+        <p:spPr bwMode="auto">
+          <a:xfrm>
+            <a:off x="1288026" y="3687095"/>
+            <a:ext cx="1040073" cy="1040073"/>
+          </a:xfrm>
+          <a:prstGeom prst="rect">
+            <a:avLst/>
+          </a:prstGeom>
+          <a:noFill/>
+          <a:extLst>
+            <a:ext uri="{909E8E84-426E-40DD-AFC4-6F175D3DCCD1}">
+              <a14:hiddenFill xmlns:a14="http://schemas.microsoft.com/office/drawing/2010/main">
+                <a:solidFill>
+                  <a:srgbClr val="FFFFFF"/>
+                </a:solidFill>
+              </a14:hiddenFill>
+            </a:ext>
+          </a:extLst>
+        </p:spPr>
+      </p:pic>
+      <p:pic>
+        <p:nvPicPr>
+          <p:cNvPr id="5" name="Picture 10" descr="Ordinateur personnel - Icônes la technologie gratuites">
+            <a:extLst>
+              <a:ext uri="{FF2B5EF4-FFF2-40B4-BE49-F238E27FC236}">
+                <a16:creationId xmlns:a16="http://schemas.microsoft.com/office/drawing/2014/main" id="{8E965AAD-7FD8-4834-09A8-16692220330F}"/>
+              </a:ext>
+            </a:extLst>
+          </p:cNvPr>
+          <p:cNvPicPr>
+            <a:picLocks noChangeAspect="1" noChangeArrowheads="1"/>
+          </p:cNvPicPr>
+          <p:nvPr/>
+        </p:nvPicPr>
+        <p:blipFill>
+          <a:blip r:embed="rId2">
+            <a:extLst>
+              <a:ext uri="{28A0092B-C50C-407E-A947-70E740481C1C}">
+                <a14:useLocalDpi xmlns:a14="http://schemas.microsoft.com/office/drawing/2010/main" val="0"/>
+              </a:ext>
+            </a:extLst>
+          </a:blip>
+          <a:srcRect/>
+          <a:stretch>
+            <a:fillRect/>
+          </a:stretch>
+        </p:blipFill>
+        <p:spPr bwMode="auto">
+          <a:xfrm>
+            <a:off x="3084558" y="3687095"/>
+            <a:ext cx="1040073" cy="1040073"/>
+          </a:xfrm>
+          <a:prstGeom prst="rect">
+            <a:avLst/>
+          </a:prstGeom>
+          <a:noFill/>
+          <a:extLst>
+            <a:ext uri="{909E8E84-426E-40DD-AFC4-6F175D3DCCD1}">
+              <a14:hiddenFill xmlns:a14="http://schemas.microsoft.com/office/drawing/2010/main">
+                <a:solidFill>
+                  <a:srgbClr val="FFFFFF"/>
+                </a:solidFill>
+              </a14:hiddenFill>
+            </a:ext>
+          </a:extLst>
+        </p:spPr>
+      </p:pic>
+      <p:pic>
+        <p:nvPicPr>
+          <p:cNvPr id="6" name="Picture 10" descr="Ordinateur personnel - Icônes la technologie gratuites">
+            <a:extLst>
+              <a:ext uri="{FF2B5EF4-FFF2-40B4-BE49-F238E27FC236}">
+                <a16:creationId xmlns:a16="http://schemas.microsoft.com/office/drawing/2014/main" id="{8550D24E-2906-C70E-B105-467035D5C6F6}"/>
+              </a:ext>
+            </a:extLst>
+          </p:cNvPr>
+          <p:cNvPicPr>
+            <a:picLocks noChangeAspect="1" noChangeArrowheads="1"/>
+          </p:cNvPicPr>
+          <p:nvPr/>
+        </p:nvPicPr>
+        <p:blipFill>
+          <a:blip r:embed="rId2">
+            <a:extLst>
+              <a:ext uri="{28A0092B-C50C-407E-A947-70E740481C1C}">
+                <a14:useLocalDpi xmlns:a14="http://schemas.microsoft.com/office/drawing/2010/main" val="0"/>
+              </a:ext>
+            </a:extLst>
+          </a:blip>
+          <a:srcRect/>
+          <a:stretch>
+            <a:fillRect/>
+          </a:stretch>
+        </p:blipFill>
+        <p:spPr bwMode="auto">
+          <a:xfrm>
+            <a:off x="5016597" y="3687095"/>
+            <a:ext cx="1040073" cy="1040073"/>
+          </a:xfrm>
+          <a:prstGeom prst="rect">
+            <a:avLst/>
+          </a:prstGeom>
+          <a:noFill/>
+          <a:extLst>
+            <a:ext uri="{909E8E84-426E-40DD-AFC4-6F175D3DCCD1}">
+              <a14:hiddenFill xmlns:a14="http://schemas.microsoft.com/office/drawing/2010/main">
+                <a:solidFill>
+                  <a:srgbClr val="FFFFFF"/>
+                </a:solidFill>
+              </a14:hiddenFill>
+            </a:ext>
+          </a:extLst>
+        </p:spPr>
+      </p:pic>
+      <p:sp>
+        <p:nvSpPr>
+          <p:cNvPr id="8" name="ZoneTexte 7">
+            <a:extLst>
+              <a:ext uri="{FF2B5EF4-FFF2-40B4-BE49-F238E27FC236}">
+                <a16:creationId xmlns:a16="http://schemas.microsoft.com/office/drawing/2014/main" id="{232FFB4D-1C0E-A007-1C41-6C80413F6C14}"/>
+              </a:ext>
+            </a:extLst>
+          </p:cNvPr>
+          <p:cNvSpPr txBox="1"/>
+          <p:nvPr/>
+        </p:nvSpPr>
+        <p:spPr>
+          <a:xfrm>
+            <a:off x="1326281" y="4727167"/>
+            <a:ext cx="963561" cy="369332"/>
+          </a:xfrm>
+          <a:prstGeom prst="rect">
+            <a:avLst/>
+          </a:prstGeom>
+          <a:noFill/>
+        </p:spPr>
+        <p:txBody>
+          <a:bodyPr wrap="square" rtlCol="0">
+            <a:spAutoFit/>
+          </a:bodyPr>
+          <a:lstStyle/>
+          <a:p>
+            <a:r>
+              <a:rPr lang="fr-FR" dirty="0"/>
+              <a:t>Client 1</a:t>
+            </a:r>
+          </a:p>
+        </p:txBody>
+      </p:sp>
+      <p:sp>
+        <p:nvSpPr>
+          <p:cNvPr id="9" name="ZoneTexte 8">
+            <a:extLst>
+              <a:ext uri="{FF2B5EF4-FFF2-40B4-BE49-F238E27FC236}">
+                <a16:creationId xmlns:a16="http://schemas.microsoft.com/office/drawing/2014/main" id="{CAF3890A-8F2B-5D69-231F-94465459472E}"/>
+              </a:ext>
+            </a:extLst>
+          </p:cNvPr>
+          <p:cNvSpPr txBox="1"/>
+          <p:nvPr/>
+        </p:nvSpPr>
+        <p:spPr>
+          <a:xfrm>
+            <a:off x="3220065" y="4727168"/>
+            <a:ext cx="963561" cy="369332"/>
+          </a:xfrm>
+          <a:prstGeom prst="rect">
+            <a:avLst/>
+          </a:prstGeom>
+          <a:noFill/>
+        </p:spPr>
+        <p:txBody>
+          <a:bodyPr wrap="square" rtlCol="0">
+            <a:spAutoFit/>
+          </a:bodyPr>
+          <a:lstStyle/>
+          <a:p>
+            <a:r>
+              <a:rPr lang="fr-FR" dirty="0"/>
+              <a:t>Client 2 </a:t>
+            </a:r>
+          </a:p>
+        </p:txBody>
+      </p:sp>
+      <p:sp>
+        <p:nvSpPr>
+          <p:cNvPr id="10" name="ZoneTexte 9">
+            <a:extLst>
+              <a:ext uri="{FF2B5EF4-FFF2-40B4-BE49-F238E27FC236}">
+                <a16:creationId xmlns:a16="http://schemas.microsoft.com/office/drawing/2014/main" id="{8B43A052-2F02-77B7-582D-C9CD76475DAD}"/>
+              </a:ext>
+            </a:extLst>
+          </p:cNvPr>
+          <p:cNvSpPr txBox="1"/>
+          <p:nvPr/>
+        </p:nvSpPr>
+        <p:spPr>
+          <a:xfrm>
+            <a:off x="5229065" y="4732705"/>
+            <a:ext cx="963561" cy="369332"/>
+          </a:xfrm>
+          <a:prstGeom prst="rect">
+            <a:avLst/>
+          </a:prstGeom>
+          <a:noFill/>
+        </p:spPr>
+        <p:txBody>
+          <a:bodyPr wrap="square" rtlCol="0">
+            <a:spAutoFit/>
+          </a:bodyPr>
+          <a:lstStyle/>
+          <a:p>
+            <a:r>
+              <a:rPr lang="fr-FR" dirty="0"/>
+              <a:t>Client 3</a:t>
+            </a:r>
+          </a:p>
+        </p:txBody>
+      </p:sp>
+      <p:pic>
+        <p:nvPicPr>
+          <p:cNvPr id="2" name="Picture 10" descr="Ordinateur personnel - Icônes la technologie gratuites">
+            <a:extLst>
+              <a:ext uri="{FF2B5EF4-FFF2-40B4-BE49-F238E27FC236}">
+                <a16:creationId xmlns:a16="http://schemas.microsoft.com/office/drawing/2014/main" id="{C6C5B885-8D87-ABE3-DBA0-3561B326D3FB}"/>
+              </a:ext>
+            </a:extLst>
+          </p:cNvPr>
+          <p:cNvPicPr>
+            <a:picLocks noChangeAspect="1" noChangeArrowheads="1"/>
+          </p:cNvPicPr>
+          <p:nvPr/>
+        </p:nvPicPr>
+        <p:blipFill>
+          <a:blip r:embed="rId2">
+            <a:extLst>
+              <a:ext uri="{28A0092B-C50C-407E-A947-70E740481C1C}">
+                <a14:useLocalDpi xmlns:a14="http://schemas.microsoft.com/office/drawing/2010/main" val="0"/>
+              </a:ext>
+            </a:extLst>
+          </a:blip>
+          <a:srcRect/>
+          <a:stretch>
+            <a:fillRect/>
+          </a:stretch>
+        </p:blipFill>
+        <p:spPr bwMode="auto">
+          <a:xfrm>
+            <a:off x="6889641" y="3687095"/>
+            <a:ext cx="1040073" cy="1040073"/>
+          </a:xfrm>
+          <a:prstGeom prst="rect">
+            <a:avLst/>
+          </a:prstGeom>
+          <a:noFill/>
+          <a:extLst>
+            <a:ext uri="{909E8E84-426E-40DD-AFC4-6F175D3DCCD1}">
+              <a14:hiddenFill xmlns:a14="http://schemas.microsoft.com/office/drawing/2010/main">
+                <a:solidFill>
+                  <a:srgbClr val="FFFFFF"/>
+                </a:solidFill>
+              </a14:hiddenFill>
+            </a:ext>
+          </a:extLst>
+        </p:spPr>
+      </p:pic>
+      <p:sp>
+        <p:nvSpPr>
+          <p:cNvPr id="13" name="ZoneTexte 12">
+            <a:extLst>
+              <a:ext uri="{FF2B5EF4-FFF2-40B4-BE49-F238E27FC236}">
+                <a16:creationId xmlns:a16="http://schemas.microsoft.com/office/drawing/2014/main" id="{713F8056-4DD4-C7EC-2D29-1DF6403C0B5A}"/>
+              </a:ext>
+            </a:extLst>
+          </p:cNvPr>
+          <p:cNvSpPr txBox="1"/>
+          <p:nvPr/>
+        </p:nvSpPr>
+        <p:spPr>
+          <a:xfrm>
+            <a:off x="7025597" y="4732703"/>
+            <a:ext cx="963561" cy="369332"/>
+          </a:xfrm>
+          <a:prstGeom prst="rect">
+            <a:avLst/>
+          </a:prstGeom>
+          <a:noFill/>
+        </p:spPr>
+        <p:txBody>
+          <a:bodyPr wrap="square" rtlCol="0">
+            <a:spAutoFit/>
+          </a:bodyPr>
+          <a:lstStyle/>
+          <a:p>
+            <a:r>
+              <a:rPr lang="fr-FR" dirty="0"/>
+              <a:t>Client 4 </a:t>
+            </a:r>
+          </a:p>
+        </p:txBody>
+      </p:sp>
+      <p:pic>
+        <p:nvPicPr>
+          <p:cNvPr id="16" name="Picture 10" descr="Ordinateur personnel - Icônes la technologie gratuites">
+            <a:extLst>
+              <a:ext uri="{FF2B5EF4-FFF2-40B4-BE49-F238E27FC236}">
+                <a16:creationId xmlns:a16="http://schemas.microsoft.com/office/drawing/2014/main" id="{A398F9E7-394B-DDDB-C841-4E44E81A80C2}"/>
+              </a:ext>
+            </a:extLst>
+          </p:cNvPr>
+          <p:cNvPicPr>
+            <a:picLocks noChangeAspect="1" noChangeArrowheads="1"/>
+          </p:cNvPicPr>
+          <p:nvPr/>
+        </p:nvPicPr>
+        <p:blipFill>
+          <a:blip r:embed="rId2">
+            <a:extLst>
+              <a:ext uri="{28A0092B-C50C-407E-A947-70E740481C1C}">
+                <a14:useLocalDpi xmlns:a14="http://schemas.microsoft.com/office/drawing/2010/main" val="0"/>
+              </a:ext>
+            </a:extLst>
+          </a:blip>
+          <a:srcRect/>
+          <a:stretch>
+            <a:fillRect/>
+          </a:stretch>
+        </p:blipFill>
+        <p:spPr bwMode="auto">
+          <a:xfrm>
+            <a:off x="8626729" y="3681557"/>
+            <a:ext cx="1040073" cy="1040073"/>
+          </a:xfrm>
+          <a:prstGeom prst="rect">
+            <a:avLst/>
+          </a:prstGeom>
+          <a:noFill/>
+          <a:extLst>
+            <a:ext uri="{909E8E84-426E-40DD-AFC4-6F175D3DCCD1}">
+              <a14:hiddenFill xmlns:a14="http://schemas.microsoft.com/office/drawing/2010/main">
+                <a:solidFill>
+                  <a:srgbClr val="FFFFFF"/>
+                </a:solidFill>
+              </a14:hiddenFill>
+            </a:ext>
+          </a:extLst>
+        </p:spPr>
+      </p:pic>
+      <p:sp>
+        <p:nvSpPr>
+          <p:cNvPr id="17" name="ZoneTexte 16">
+            <a:extLst>
+              <a:ext uri="{FF2B5EF4-FFF2-40B4-BE49-F238E27FC236}">
+                <a16:creationId xmlns:a16="http://schemas.microsoft.com/office/drawing/2014/main" id="{43D3B572-BB74-C726-31B0-87D31A48E886}"/>
+              </a:ext>
+            </a:extLst>
+          </p:cNvPr>
+          <p:cNvSpPr txBox="1"/>
+          <p:nvPr/>
+        </p:nvSpPr>
+        <p:spPr>
+          <a:xfrm>
+            <a:off x="8839197" y="4727167"/>
+            <a:ext cx="963561" cy="369332"/>
+          </a:xfrm>
+          <a:prstGeom prst="rect">
+            <a:avLst/>
+          </a:prstGeom>
+          <a:noFill/>
+        </p:spPr>
+        <p:txBody>
+          <a:bodyPr wrap="square" rtlCol="0">
+            <a:spAutoFit/>
+          </a:bodyPr>
+          <a:lstStyle/>
+          <a:p>
+            <a:r>
+              <a:rPr lang="fr-FR" dirty="0"/>
+              <a:t>Client 5 </a:t>
+            </a:r>
+          </a:p>
+        </p:txBody>
+      </p:sp>
+      <p:pic>
+        <p:nvPicPr>
+          <p:cNvPr id="1026" name="Picture 2" descr="Base de donnees - Téléchargement icônes gratuites">
+            <a:extLst>
+              <a:ext uri="{FF2B5EF4-FFF2-40B4-BE49-F238E27FC236}">
+                <a16:creationId xmlns:a16="http://schemas.microsoft.com/office/drawing/2014/main" id="{6822251D-9952-5C05-23C9-624242AF4E1C}"/>
+              </a:ext>
+            </a:extLst>
+          </p:cNvPr>
+          <p:cNvPicPr>
+            <a:picLocks noChangeAspect="1" noChangeArrowheads="1"/>
+          </p:cNvPicPr>
+          <p:nvPr/>
+        </p:nvPicPr>
+        <p:blipFill>
+          <a:blip r:embed="rId3">
+            <a:extLst>
+              <a:ext uri="{28A0092B-C50C-407E-A947-70E740481C1C}">
+                <a14:useLocalDpi xmlns:a14="http://schemas.microsoft.com/office/drawing/2010/main" val="0"/>
+              </a:ext>
+            </a:extLst>
+          </a:blip>
+          <a:srcRect/>
+          <a:stretch>
+            <a:fillRect/>
+          </a:stretch>
+        </p:blipFill>
+        <p:spPr bwMode="auto">
+          <a:xfrm>
+            <a:off x="5016597" y="475169"/>
+            <a:ext cx="1104606" cy="1104606"/>
+          </a:xfrm>
+          <a:prstGeom prst="rect">
+            <a:avLst/>
+          </a:prstGeom>
+          <a:noFill/>
+          <a:extLst>
+            <a:ext uri="{909E8E84-426E-40DD-AFC4-6F175D3DCCD1}">
+              <a14:hiddenFill xmlns:a14="http://schemas.microsoft.com/office/drawing/2010/main">
+                <a:solidFill>
+                  <a:srgbClr val="FFFFFF"/>
+                </a:solidFill>
+              </a14:hiddenFill>
+            </a:ext>
+          </a:extLst>
+        </p:spPr>
+      </p:pic>
+      <p:sp>
+        <p:nvSpPr>
+          <p:cNvPr id="18" name="ZoneTexte 17">
+            <a:extLst>
+              <a:ext uri="{FF2B5EF4-FFF2-40B4-BE49-F238E27FC236}">
+                <a16:creationId xmlns:a16="http://schemas.microsoft.com/office/drawing/2014/main" id="{4A67E8EB-A3F4-CC98-9D02-CBC992222E02}"/>
+              </a:ext>
+            </a:extLst>
+          </p:cNvPr>
+          <p:cNvSpPr txBox="1"/>
+          <p:nvPr/>
+        </p:nvSpPr>
+        <p:spPr>
+          <a:xfrm>
+            <a:off x="6381135" y="835742"/>
+            <a:ext cx="1809150" cy="369332"/>
+          </a:xfrm>
+          <a:prstGeom prst="rect">
+            <a:avLst/>
+          </a:prstGeom>
+          <a:noFill/>
+        </p:spPr>
+        <p:txBody>
+          <a:bodyPr wrap="none" rtlCol="0">
+            <a:spAutoFit/>
+          </a:bodyPr>
+          <a:lstStyle/>
+          <a:p>
+            <a:r>
+              <a:rPr lang="fr-FR" dirty="0"/>
+              <a:t>MNIST database</a:t>
+            </a:r>
+          </a:p>
+        </p:txBody>
+      </p:sp>
+      <p:cxnSp>
+        <p:nvCxnSpPr>
+          <p:cNvPr id="26" name="Connecteur droit avec flèche 25">
+            <a:extLst>
+              <a:ext uri="{FF2B5EF4-FFF2-40B4-BE49-F238E27FC236}">
+                <a16:creationId xmlns:a16="http://schemas.microsoft.com/office/drawing/2014/main" id="{30666BFC-9C65-5D02-F76F-5B1C29CF2250}"/>
+              </a:ext>
+            </a:extLst>
+          </p:cNvPr>
+          <p:cNvCxnSpPr/>
+          <p:nvPr/>
+        </p:nvCxnSpPr>
+        <p:spPr>
+          <a:xfrm flipH="1">
+            <a:off x="2192594" y="1445342"/>
+            <a:ext cx="2733367" cy="2236215"/>
+          </a:xfrm>
+          <a:prstGeom prst="straightConnector1">
+            <a:avLst/>
+          </a:prstGeom>
+          <a:ln>
+            <a:tailEnd type="triangle"/>
+          </a:ln>
+        </p:spPr>
+        <p:style>
+          <a:lnRef idx="2">
+            <a:schemeClr val="accent1"/>
+          </a:lnRef>
+          <a:fillRef idx="0">
+            <a:schemeClr val="accent1"/>
+          </a:fillRef>
+          <a:effectRef idx="1">
+            <a:schemeClr val="accent1"/>
+          </a:effectRef>
+          <a:fontRef idx="minor">
+            <a:schemeClr val="tx1"/>
+          </a:fontRef>
+        </p:style>
+      </p:cxnSp>
+      <p:cxnSp>
+        <p:nvCxnSpPr>
+          <p:cNvPr id="29" name="Connecteur droit avec flèche 28">
+            <a:extLst>
+              <a:ext uri="{FF2B5EF4-FFF2-40B4-BE49-F238E27FC236}">
+                <a16:creationId xmlns:a16="http://schemas.microsoft.com/office/drawing/2014/main" id="{12694ABE-45FD-ED5F-0BE5-F2AB676A057B}"/>
+              </a:ext>
+            </a:extLst>
+          </p:cNvPr>
+          <p:cNvCxnSpPr/>
+          <p:nvPr/>
+        </p:nvCxnSpPr>
+        <p:spPr>
+          <a:xfrm flipH="1">
+            <a:off x="3972232" y="1720645"/>
+            <a:ext cx="1256833" cy="1960912"/>
+          </a:xfrm>
+          <a:prstGeom prst="straightConnector1">
+            <a:avLst/>
+          </a:prstGeom>
+          <a:ln>
+            <a:tailEnd type="triangle"/>
+          </a:ln>
+        </p:spPr>
+        <p:style>
+          <a:lnRef idx="2">
+            <a:schemeClr val="accent1"/>
+          </a:lnRef>
+          <a:fillRef idx="0">
+            <a:schemeClr val="accent1"/>
+          </a:fillRef>
+          <a:effectRef idx="1">
+            <a:schemeClr val="accent1"/>
+          </a:effectRef>
+          <a:fontRef idx="minor">
+            <a:schemeClr val="tx1"/>
+          </a:fontRef>
+        </p:style>
+      </p:cxnSp>
+      <p:cxnSp>
+        <p:nvCxnSpPr>
+          <p:cNvPr id="31" name="Connecteur droit avec flèche 30">
+            <a:extLst>
+              <a:ext uri="{FF2B5EF4-FFF2-40B4-BE49-F238E27FC236}">
+                <a16:creationId xmlns:a16="http://schemas.microsoft.com/office/drawing/2014/main" id="{394B669D-562C-1508-7C98-C7B9EDA29147}"/>
+              </a:ext>
+            </a:extLst>
+          </p:cNvPr>
+          <p:cNvCxnSpPr/>
+          <p:nvPr/>
+        </p:nvCxnSpPr>
+        <p:spPr>
+          <a:xfrm>
+            <a:off x="5710845" y="1809135"/>
+            <a:ext cx="0" cy="1872422"/>
+          </a:xfrm>
+          <a:prstGeom prst="straightConnector1">
+            <a:avLst/>
+          </a:prstGeom>
+          <a:ln>
+            <a:tailEnd type="triangle"/>
+          </a:ln>
+        </p:spPr>
+        <p:style>
+          <a:lnRef idx="2">
+            <a:schemeClr val="accent1"/>
+          </a:lnRef>
+          <a:fillRef idx="0">
+            <a:schemeClr val="accent1"/>
+          </a:fillRef>
+          <a:effectRef idx="1">
+            <a:schemeClr val="accent1"/>
+          </a:effectRef>
+          <a:fontRef idx="minor">
+            <a:schemeClr val="tx1"/>
+          </a:fontRef>
+        </p:style>
+      </p:cxnSp>
+      <p:cxnSp>
+        <p:nvCxnSpPr>
+          <p:cNvPr id="33" name="Connecteur droit avec flèche 32">
+            <a:extLst>
+              <a:ext uri="{FF2B5EF4-FFF2-40B4-BE49-F238E27FC236}">
+                <a16:creationId xmlns:a16="http://schemas.microsoft.com/office/drawing/2014/main" id="{47FD132B-1E94-B8F2-D826-D6D7FC7104B2}"/>
+              </a:ext>
+            </a:extLst>
+          </p:cNvPr>
+          <p:cNvCxnSpPr/>
+          <p:nvPr/>
+        </p:nvCxnSpPr>
+        <p:spPr>
+          <a:xfrm>
+            <a:off x="6076335" y="1579775"/>
+            <a:ext cx="1209375" cy="1989335"/>
+          </a:xfrm>
+          <a:prstGeom prst="straightConnector1">
+            <a:avLst/>
+          </a:prstGeom>
+          <a:ln>
+            <a:tailEnd type="triangle"/>
+          </a:ln>
+        </p:spPr>
+        <p:style>
+          <a:lnRef idx="2">
+            <a:schemeClr val="accent1"/>
+          </a:lnRef>
+          <a:fillRef idx="0">
+            <a:schemeClr val="accent1"/>
+          </a:fillRef>
+          <a:effectRef idx="1">
+            <a:schemeClr val="accent1"/>
+          </a:effectRef>
+          <a:fontRef idx="minor">
+            <a:schemeClr val="tx1"/>
+          </a:fontRef>
+        </p:style>
+      </p:cxnSp>
+      <p:cxnSp>
+        <p:nvCxnSpPr>
+          <p:cNvPr id="35" name="Connecteur droit avec flèche 34">
+            <a:extLst>
+              <a:ext uri="{FF2B5EF4-FFF2-40B4-BE49-F238E27FC236}">
+                <a16:creationId xmlns:a16="http://schemas.microsoft.com/office/drawing/2014/main" id="{07844184-8348-D288-043F-55A49E3CAC65}"/>
+              </a:ext>
+            </a:extLst>
+          </p:cNvPr>
+          <p:cNvCxnSpPr/>
+          <p:nvPr/>
+        </p:nvCxnSpPr>
+        <p:spPr>
+          <a:xfrm>
+            <a:off x="6192626" y="1445342"/>
+            <a:ext cx="2434103" cy="2123768"/>
+          </a:xfrm>
+          <a:prstGeom prst="straightConnector1">
+            <a:avLst/>
+          </a:prstGeom>
+          <a:ln>
+            <a:tailEnd type="triangle"/>
+          </a:ln>
+        </p:spPr>
+        <p:style>
+          <a:lnRef idx="2">
+            <a:schemeClr val="accent1"/>
+          </a:lnRef>
+          <a:fillRef idx="0">
+            <a:schemeClr val="accent1"/>
+          </a:fillRef>
+          <a:effectRef idx="1">
+            <a:schemeClr val="accent1"/>
+          </a:effectRef>
+          <a:fontRef idx="minor">
+            <a:schemeClr val="tx1"/>
+          </a:fontRef>
+        </p:style>
+      </p:cxnSp>
+      <p:sp>
+        <p:nvSpPr>
+          <p:cNvPr id="36" name="ZoneTexte 35">
+            <a:extLst>
+              <a:ext uri="{FF2B5EF4-FFF2-40B4-BE49-F238E27FC236}">
+                <a16:creationId xmlns:a16="http://schemas.microsoft.com/office/drawing/2014/main" id="{DC54226B-E097-CD2F-2A59-D92A1A2D42F3}"/>
+              </a:ext>
+            </a:extLst>
+          </p:cNvPr>
+          <p:cNvSpPr txBox="1"/>
+          <p:nvPr/>
+        </p:nvSpPr>
+        <p:spPr>
+          <a:xfrm rot="19286242">
+            <a:off x="2424918" y="2223149"/>
+            <a:ext cx="1844736" cy="369332"/>
+          </a:xfrm>
+          <a:prstGeom prst="rect">
+            <a:avLst/>
+          </a:prstGeom>
+          <a:noFill/>
+        </p:spPr>
+        <p:txBody>
+          <a:bodyPr wrap="none" rtlCol="0">
+            <a:spAutoFit/>
+          </a:bodyPr>
+          <a:lstStyle/>
+          <a:p>
+            <a:r>
+              <a:rPr lang="fr-FR" dirty="0">
+                <a:solidFill>
+                  <a:schemeClr val="tx1">
+                    <a:lumMod val="95000"/>
+                    <a:lumOff val="5000"/>
+                  </a:schemeClr>
+                </a:solidFill>
+              </a:rPr>
+              <a:t>1000 data points</a:t>
+            </a:r>
+          </a:p>
+        </p:txBody>
+      </p:sp>
+      <p:sp>
+        <p:nvSpPr>
+          <p:cNvPr id="39" name="ZoneTexte 38">
+            <a:extLst>
+              <a:ext uri="{FF2B5EF4-FFF2-40B4-BE49-F238E27FC236}">
+                <a16:creationId xmlns:a16="http://schemas.microsoft.com/office/drawing/2014/main" id="{88C0501F-A02B-78A9-0608-193B221B9738}"/>
+              </a:ext>
+            </a:extLst>
+          </p:cNvPr>
+          <p:cNvSpPr txBox="1"/>
+          <p:nvPr/>
+        </p:nvSpPr>
+        <p:spPr>
+          <a:xfrm rot="18216875">
+            <a:off x="3328068" y="2465708"/>
+            <a:ext cx="1844736" cy="369332"/>
+          </a:xfrm>
+          <a:prstGeom prst="rect">
+            <a:avLst/>
+          </a:prstGeom>
+          <a:noFill/>
+        </p:spPr>
+        <p:txBody>
+          <a:bodyPr wrap="none" rtlCol="0">
+            <a:spAutoFit/>
+          </a:bodyPr>
+          <a:lstStyle/>
+          <a:p>
+            <a:r>
+              <a:rPr lang="fr-FR" dirty="0">
+                <a:solidFill>
+                  <a:schemeClr val="accent6">
+                    <a:lumMod val="75000"/>
+                  </a:schemeClr>
+                </a:solidFill>
+              </a:rPr>
+              <a:t>1000 data points</a:t>
+            </a:r>
+          </a:p>
+        </p:txBody>
+      </p:sp>
+      <p:sp>
+        <p:nvSpPr>
+          <p:cNvPr id="40" name="ZoneTexte 39">
+            <a:extLst>
+              <a:ext uri="{FF2B5EF4-FFF2-40B4-BE49-F238E27FC236}">
+                <a16:creationId xmlns:a16="http://schemas.microsoft.com/office/drawing/2014/main" id="{882C797A-7519-FB20-B447-CCEA660C0089}"/>
+              </a:ext>
+            </a:extLst>
+          </p:cNvPr>
+          <p:cNvSpPr txBox="1"/>
+          <p:nvPr/>
+        </p:nvSpPr>
+        <p:spPr>
+          <a:xfrm rot="2378654">
+            <a:off x="6689992" y="2223148"/>
+            <a:ext cx="1844736" cy="369332"/>
+          </a:xfrm>
+          <a:prstGeom prst="rect">
+            <a:avLst/>
+          </a:prstGeom>
+          <a:noFill/>
+        </p:spPr>
+        <p:txBody>
+          <a:bodyPr wrap="none" rtlCol="0">
+            <a:spAutoFit/>
+          </a:bodyPr>
+          <a:lstStyle/>
+          <a:p>
+            <a:r>
+              <a:rPr lang="fr-FR" dirty="0">
+                <a:solidFill>
+                  <a:schemeClr val="accent2"/>
+                </a:solidFill>
+              </a:rPr>
+              <a:t>1000 data points</a:t>
+            </a:r>
+          </a:p>
+        </p:txBody>
+      </p:sp>
+      <p:sp>
+        <p:nvSpPr>
+          <p:cNvPr id="41" name="ZoneTexte 40">
+            <a:extLst>
+              <a:ext uri="{FF2B5EF4-FFF2-40B4-BE49-F238E27FC236}">
+                <a16:creationId xmlns:a16="http://schemas.microsoft.com/office/drawing/2014/main" id="{71C55A15-3AE4-28BF-F8F1-20B695DEAAEF}"/>
+              </a:ext>
+            </a:extLst>
+          </p:cNvPr>
+          <p:cNvSpPr txBox="1"/>
+          <p:nvPr/>
+        </p:nvSpPr>
+        <p:spPr>
+          <a:xfrm rot="16200000">
+            <a:off x="4562786" y="2558704"/>
+            <a:ext cx="1844736" cy="369332"/>
+          </a:xfrm>
+          <a:prstGeom prst="rect">
+            <a:avLst/>
+          </a:prstGeom>
+          <a:noFill/>
+        </p:spPr>
+        <p:txBody>
+          <a:bodyPr wrap="none" rtlCol="0">
+            <a:spAutoFit/>
+          </a:bodyPr>
+          <a:lstStyle/>
+          <a:p>
+            <a:r>
+              <a:rPr lang="fr-FR" dirty="0">
+                <a:solidFill>
+                  <a:srgbClr val="FF0000"/>
+                </a:solidFill>
+                <a:highlight>
+                  <a:srgbClr val="F0F8FF"/>
+                </a:highlight>
+              </a:rPr>
+              <a:t>1000 data points</a:t>
+            </a:r>
+          </a:p>
+        </p:txBody>
+      </p:sp>
+      <p:sp>
+        <p:nvSpPr>
+          <p:cNvPr id="42" name="ZoneTexte 41">
+            <a:extLst>
+              <a:ext uri="{FF2B5EF4-FFF2-40B4-BE49-F238E27FC236}">
+                <a16:creationId xmlns:a16="http://schemas.microsoft.com/office/drawing/2014/main" id="{951966EA-2DA5-A26F-224E-6B04E529EA97}"/>
+              </a:ext>
+            </a:extLst>
+          </p:cNvPr>
+          <p:cNvSpPr txBox="1"/>
+          <p:nvPr/>
+        </p:nvSpPr>
+        <p:spPr>
+          <a:xfrm rot="3433743">
+            <a:off x="6046488" y="2499991"/>
+            <a:ext cx="1844736" cy="369332"/>
+          </a:xfrm>
+          <a:prstGeom prst="rect">
+            <a:avLst/>
+          </a:prstGeom>
+          <a:noFill/>
+        </p:spPr>
+        <p:txBody>
+          <a:bodyPr wrap="none" rtlCol="0">
+            <a:spAutoFit/>
+          </a:bodyPr>
+          <a:lstStyle/>
+          <a:p>
+            <a:r>
+              <a:rPr lang="fr-FR" dirty="0">
+                <a:solidFill>
+                  <a:srgbClr val="7030A0"/>
+                </a:solidFill>
+              </a:rPr>
+              <a:t>1000 data points</a:t>
+            </a:r>
+          </a:p>
+        </p:txBody>
+      </p:sp>
+      <p:sp>
+        <p:nvSpPr>
+          <p:cNvPr id="44" name="Parenthèse fermante 43">
+            <a:extLst>
+              <a:ext uri="{FF2B5EF4-FFF2-40B4-BE49-F238E27FC236}">
+                <a16:creationId xmlns:a16="http://schemas.microsoft.com/office/drawing/2014/main" id="{93594B74-82DC-B11E-ADB6-774EDDFA3F3C}"/>
+              </a:ext>
+            </a:extLst>
+          </p:cNvPr>
+          <p:cNvSpPr/>
+          <p:nvPr/>
+        </p:nvSpPr>
+        <p:spPr>
+          <a:xfrm rot="5400000">
+            <a:off x="5261737" y="152144"/>
+            <a:ext cx="614326" cy="9550400"/>
+          </a:xfrm>
+          <a:prstGeom prst="rightBracket">
+            <a:avLst/>
+          </a:prstGeom>
+        </p:spPr>
+        <p:style>
+          <a:lnRef idx="2">
+            <a:schemeClr val="accent1"/>
+          </a:lnRef>
+          <a:fillRef idx="0">
+            <a:schemeClr val="accent1"/>
+          </a:fillRef>
+          <a:effectRef idx="1">
+            <a:schemeClr val="accent1"/>
+          </a:effectRef>
+          <a:fontRef idx="minor">
+            <a:schemeClr val="tx1"/>
+          </a:fontRef>
+        </p:style>
+        <p:txBody>
+          <a:bodyPr rtlCol="0" anchor="ctr"/>
+          <a:lstStyle/>
+          <a:p>
+            <a:pPr algn="ctr"/>
+            <a:endParaRPr lang="fr-FR"/>
+          </a:p>
+        </p:txBody>
+      </p:sp>
+      <p:pic>
+        <p:nvPicPr>
+          <p:cNvPr id="45" name="Picture 10" descr="Ordinateur personnel - Icônes la technologie gratuites">
+            <a:extLst>
+              <a:ext uri="{FF2B5EF4-FFF2-40B4-BE49-F238E27FC236}">
+                <a16:creationId xmlns:a16="http://schemas.microsoft.com/office/drawing/2014/main" id="{1CC9E322-A723-4F95-CAD4-468C84DAAC26}"/>
+              </a:ext>
+            </a:extLst>
+          </p:cNvPr>
+          <p:cNvPicPr>
+            <a:picLocks noChangeAspect="1" noChangeArrowheads="1"/>
+          </p:cNvPicPr>
+          <p:nvPr/>
+        </p:nvPicPr>
+        <p:blipFill>
+          <a:blip r:embed="rId2">
+            <a:extLst>
+              <a:ext uri="{28A0092B-C50C-407E-A947-70E740481C1C}">
+                <a14:useLocalDpi xmlns:a14="http://schemas.microsoft.com/office/drawing/2010/main" val="0"/>
+              </a:ext>
+            </a:extLst>
+          </a:blip>
+          <a:srcRect/>
+          <a:stretch>
+            <a:fillRect/>
+          </a:stretch>
+        </p:blipFill>
+        <p:spPr bwMode="auto">
+          <a:xfrm>
+            <a:off x="4914849" y="5347032"/>
+            <a:ext cx="1040073" cy="1040073"/>
+          </a:xfrm>
+          <a:prstGeom prst="rect">
+            <a:avLst/>
+          </a:prstGeom>
+          <a:noFill/>
+          <a:extLst>
+            <a:ext uri="{909E8E84-426E-40DD-AFC4-6F175D3DCCD1}">
+              <a14:hiddenFill xmlns:a14="http://schemas.microsoft.com/office/drawing/2010/main">
+                <a:solidFill>
+                  <a:srgbClr val="FFFFFF"/>
+                </a:solidFill>
+              </a14:hiddenFill>
+            </a:ext>
+          </a:extLst>
+        </p:spPr>
+      </p:pic>
+      <p:sp>
+        <p:nvSpPr>
+          <p:cNvPr id="46" name="ZoneTexte 45">
+            <a:extLst>
+              <a:ext uri="{FF2B5EF4-FFF2-40B4-BE49-F238E27FC236}">
+                <a16:creationId xmlns:a16="http://schemas.microsoft.com/office/drawing/2014/main" id="{4D67D70C-8F84-BEE5-44D2-958F2C9EC785}"/>
+              </a:ext>
+            </a:extLst>
+          </p:cNvPr>
+          <p:cNvSpPr txBox="1"/>
+          <p:nvPr/>
+        </p:nvSpPr>
+        <p:spPr>
+          <a:xfrm>
+            <a:off x="6054735" y="5682402"/>
+            <a:ext cx="1452642" cy="369332"/>
+          </a:xfrm>
+          <a:prstGeom prst="rect">
+            <a:avLst/>
+          </a:prstGeom>
+          <a:noFill/>
+        </p:spPr>
+        <p:txBody>
+          <a:bodyPr wrap="none" rtlCol="0">
+            <a:spAutoFit/>
+          </a:bodyPr>
+          <a:lstStyle/>
+          <a:p>
+            <a:r>
+              <a:rPr lang="fr-FR" dirty="0"/>
+              <a:t>Global client</a:t>
+            </a:r>
+          </a:p>
+        </p:txBody>
+      </p:sp>
+      <p:cxnSp>
+        <p:nvCxnSpPr>
+          <p:cNvPr id="48" name="Connecteur droit avec flèche 47">
+            <a:extLst>
+              <a:ext uri="{FF2B5EF4-FFF2-40B4-BE49-F238E27FC236}">
+                <a16:creationId xmlns:a16="http://schemas.microsoft.com/office/drawing/2014/main" id="{FDCDC67A-36EC-F183-9FEB-0635D868CFB0}"/>
+              </a:ext>
+            </a:extLst>
+          </p:cNvPr>
+          <p:cNvCxnSpPr>
+            <a:stCxn id="44" idx="2"/>
+          </p:cNvCxnSpPr>
+          <p:nvPr/>
+        </p:nvCxnSpPr>
+        <p:spPr>
+          <a:xfrm>
+            <a:off x="5568900" y="5234507"/>
+            <a:ext cx="0" cy="318949"/>
+          </a:xfrm>
+          <a:prstGeom prst="straightConnector1">
+            <a:avLst/>
+          </a:prstGeom>
+          <a:ln>
+            <a:tailEnd type="triangle"/>
+          </a:ln>
+        </p:spPr>
+        <p:style>
+          <a:lnRef idx="2">
+            <a:schemeClr val="accent1"/>
+          </a:lnRef>
+          <a:fillRef idx="0">
+            <a:schemeClr val="accent1"/>
+          </a:fillRef>
+          <a:effectRef idx="1">
+            <a:schemeClr val="accent1"/>
+          </a:effectRef>
+          <a:fontRef idx="minor">
+            <a:schemeClr val="tx1"/>
+          </a:fontRef>
+        </p:style>
+      </p:cxnSp>
+    </p:spTree>
+    <p:extLst>
+      <p:ext uri="{BB962C8B-B14F-4D97-AF65-F5344CB8AC3E}">
+        <p14:creationId xmlns:p14="http://schemas.microsoft.com/office/powerpoint/2010/main" val="338268220"/>
+      </p:ext>
+    </p:extLst>
+  </p:cSld>
+  <p:clrMapOvr>
+    <a:masterClrMapping/>
+  </p:clrMapOvr>
   <mc:AlternateContent xmlns:mc="http://schemas.openxmlformats.org/markup-compatibility/2006">
     <mc:Choice xmlns:p14="http://schemas.microsoft.com/office/powerpoint/2010/main" Requires="p14">
       <p:transition spd="med" p14:dur="700" advClick="0" advTm="7000">
@@ -8321,13 +9559,13 @@
   <p:clrMapOvr>
     <a:masterClrMapping/>
   </p:clrMapOvr>
-  <mc:AlternateContent xmlns:mc="http://schemas.openxmlformats.org/markup-compatibility/2006">
-    <mc:Choice xmlns:p14="http://schemas.microsoft.com/office/powerpoint/2010/main" Requires="p14">
+  <mc:AlternateContent xmlns:mc="http://schemas.openxmlformats.org/markup-compatibility/2006" xmlns:p14="http://schemas.microsoft.com/office/powerpoint/2010/main">
+    <mc:Choice Requires="p14">
       <p:transition spd="med" p14:dur="700" advClick="0" advTm="13000">
         <p:fade/>
       </p:transition>
     </mc:Choice>
-    <mc:Fallback>
+    <mc:Fallback xmlns="">
       <p:transition spd="med" advClick="0" advTm="13000">
         <p:fade/>
       </p:transition>
@@ -12026,7 +13264,12 @@
           <a:prstGeom prst="rect">
             <a:avLst/>
           </a:prstGeom>
-          <a:noFill/>
+          <a:ln>
+            <a:noFill/>
+          </a:ln>
+          <a:effectLst>
+            <a:softEdge rad="112500"/>
+          </a:effectLst>
           <a:extLst>
             <a:ext uri="{909E8E84-426E-40DD-AFC4-6F175D3DCCD1}">
               <a14:hiddenFill xmlns:a14="http://schemas.microsoft.com/office/drawing/2010/main">
@@ -12108,7 +13351,12 @@
           <a:prstGeom prst="rect">
             <a:avLst/>
           </a:prstGeom>
-          <a:noFill/>
+          <a:ln>
+            <a:noFill/>
+          </a:ln>
+          <a:effectLst>
+            <a:softEdge rad="112500"/>
+          </a:effectLst>
           <a:extLst>
             <a:ext uri="{909E8E84-426E-40DD-AFC4-6F175D3DCCD1}">
               <a14:hiddenFill xmlns:a14="http://schemas.microsoft.com/office/drawing/2010/main">
@@ -12155,7 +13403,12 @@
           <a:prstGeom prst="rect">
             <a:avLst/>
           </a:prstGeom>
-          <a:noFill/>
+          <a:ln>
+            <a:noFill/>
+          </a:ln>
+          <a:effectLst>
+            <a:softEdge rad="112500"/>
+          </a:effectLst>
           <a:extLst>
             <a:ext uri="{909E8E84-426E-40DD-AFC4-6F175D3DCCD1}">
               <a14:hiddenFill xmlns:a14="http://schemas.microsoft.com/office/drawing/2010/main">
@@ -12202,7 +13455,12 @@
           <a:prstGeom prst="rect">
             <a:avLst/>
           </a:prstGeom>
-          <a:noFill/>
+          <a:ln>
+            <a:noFill/>
+          </a:ln>
+          <a:effectLst>
+            <a:softEdge rad="112500"/>
+          </a:effectLst>
           <a:extLst>
             <a:ext uri="{909E8E84-426E-40DD-AFC4-6F175D3DCCD1}">
               <a14:hiddenFill xmlns:a14="http://schemas.microsoft.com/office/drawing/2010/main">
@@ -12492,495 +13750,6 @@
           <a:prstGeom prst="rect">
             <a:avLst/>
           </a:prstGeom>
-          <a:noFill/>
-          <a:extLst>
-            <a:ext uri="{909E8E84-426E-40DD-AFC4-6F175D3DCCD1}">
-              <a14:hiddenFill xmlns:a14="http://schemas.microsoft.com/office/drawing/2010/main">
-                <a:solidFill>
-                  <a:srgbClr val="FFFFFF"/>
-                </a:solidFill>
-              </a14:hiddenFill>
-            </a:ext>
-          </a:extLst>
-        </p:spPr>
-      </p:pic>
-      <p:pic>
-        <p:nvPicPr>
-          <p:cNvPr id="3" name="Picture 2" descr="Rotation de la flèche vers la droite - Icônes flèches gratuites">
-            <a:extLst>
-              <a:ext uri="{FF2B5EF4-FFF2-40B4-BE49-F238E27FC236}">
-                <a16:creationId xmlns:a16="http://schemas.microsoft.com/office/drawing/2014/main" id="{6ED1D3C0-F1F3-6C09-0585-702277AB643C}"/>
-              </a:ext>
-            </a:extLst>
-          </p:cNvPr>
-          <p:cNvPicPr>
-            <a:picLocks noChangeAspect="1" noChangeArrowheads="1"/>
-          </p:cNvPicPr>
-          <p:nvPr/>
-        </p:nvPicPr>
-        <p:blipFill>
-          <a:blip r:embed="rId4">
-            <a:extLst>
-              <a:ext uri="{28A0092B-C50C-407E-A947-70E740481C1C}">
-                <a14:useLocalDpi xmlns:a14="http://schemas.microsoft.com/office/drawing/2010/main" val="0"/>
-              </a:ext>
-            </a:extLst>
-          </a:blip>
-          <a:srcRect/>
-          <a:stretch>
-            <a:fillRect/>
-          </a:stretch>
-        </p:blipFill>
-        <p:spPr bwMode="auto">
-          <a:xfrm>
-            <a:off x="5783066" y="3124511"/>
-            <a:ext cx="572418" cy="572418"/>
-          </a:xfrm>
-          <a:prstGeom prst="rect">
-            <a:avLst/>
-          </a:prstGeom>
-          <a:noFill/>
-          <a:extLst>
-            <a:ext uri="{909E8E84-426E-40DD-AFC4-6F175D3DCCD1}">
-              <a14:hiddenFill xmlns:a14="http://schemas.microsoft.com/office/drawing/2010/main">
-                <a:solidFill>
-                  <a:srgbClr val="FFFFFF"/>
-                </a:solidFill>
-              </a14:hiddenFill>
-            </a:ext>
-          </a:extLst>
-        </p:spPr>
-      </p:pic>
-      <p:pic>
-        <p:nvPicPr>
-          <p:cNvPr id="13" name="Picture 2" descr="Rotation de la flèche vers la droite - Icônes flèches gratuites">
-            <a:extLst>
-              <a:ext uri="{FF2B5EF4-FFF2-40B4-BE49-F238E27FC236}">
-                <a16:creationId xmlns:a16="http://schemas.microsoft.com/office/drawing/2014/main" id="{9AC311B4-F3E0-A3A9-805C-CA2AFA8C80E8}"/>
-              </a:ext>
-            </a:extLst>
-          </p:cNvPr>
-          <p:cNvPicPr>
-            <a:picLocks noChangeAspect="1" noChangeArrowheads="1"/>
-          </p:cNvPicPr>
-          <p:nvPr/>
-        </p:nvPicPr>
-        <p:blipFill>
-          <a:blip r:embed="rId4">
-            <a:extLst>
-              <a:ext uri="{28A0092B-C50C-407E-A947-70E740481C1C}">
-                <a14:useLocalDpi xmlns:a14="http://schemas.microsoft.com/office/drawing/2010/main" val="0"/>
-              </a:ext>
-            </a:extLst>
-          </a:blip>
-          <a:srcRect/>
-          <a:stretch>
-            <a:fillRect/>
-          </a:stretch>
-        </p:blipFill>
-        <p:spPr bwMode="auto">
-          <a:xfrm>
-            <a:off x="8518579" y="3109140"/>
-            <a:ext cx="572418" cy="572418"/>
-          </a:xfrm>
-          <a:prstGeom prst="rect">
-            <a:avLst/>
-          </a:prstGeom>
-          <a:noFill/>
-          <a:extLst>
-            <a:ext uri="{909E8E84-426E-40DD-AFC4-6F175D3DCCD1}">
-              <a14:hiddenFill xmlns:a14="http://schemas.microsoft.com/office/drawing/2010/main">
-                <a:solidFill>
-                  <a:srgbClr val="FFFFFF"/>
-                </a:solidFill>
-              </a14:hiddenFill>
-            </a:ext>
-          </a:extLst>
-        </p:spPr>
-      </p:pic>
-      <p:sp>
-        <p:nvSpPr>
-          <p:cNvPr id="2" name="ZoneTexte 1">
-            <a:extLst>
-              <a:ext uri="{FF2B5EF4-FFF2-40B4-BE49-F238E27FC236}">
-                <a16:creationId xmlns:a16="http://schemas.microsoft.com/office/drawing/2014/main" id="{6E77F0AB-CC26-AE91-5C22-2F64FAAC7287}"/>
-              </a:ext>
-            </a:extLst>
-          </p:cNvPr>
-          <p:cNvSpPr txBox="1"/>
-          <p:nvPr/>
-        </p:nvSpPr>
-        <p:spPr>
-          <a:xfrm>
-            <a:off x="2002007" y="1233328"/>
-            <a:ext cx="853119" cy="553998"/>
-          </a:xfrm>
-          <a:prstGeom prst="rect">
-            <a:avLst/>
-          </a:prstGeom>
-          <a:noFill/>
-        </p:spPr>
-        <p:txBody>
-          <a:bodyPr wrap="none" rtlCol="0">
-            <a:spAutoFit/>
-          </a:bodyPr>
-          <a:lstStyle/>
-          <a:p>
-            <a:r>
-              <a:rPr lang="fr-FR" sz="1500" dirty="0" err="1"/>
-              <a:t>Weight</a:t>
-            </a:r>
-            <a:r>
-              <a:rPr lang="fr-FR" sz="1500" dirty="0"/>
-              <a:t> :</a:t>
-            </a:r>
-          </a:p>
-          <a:p>
-            <a:r>
-              <a:rPr lang="fr-FR" sz="1500" dirty="0"/>
-              <a:t>Data : </a:t>
-            </a:r>
-          </a:p>
-        </p:txBody>
-      </p:sp>
-      <p:sp>
-        <p:nvSpPr>
-          <p:cNvPr id="7" name="Rectangle 6">
-            <a:extLst>
-              <a:ext uri="{FF2B5EF4-FFF2-40B4-BE49-F238E27FC236}">
-                <a16:creationId xmlns:a16="http://schemas.microsoft.com/office/drawing/2014/main" id="{92FED94C-F2A9-3972-CF68-038675708365}"/>
-              </a:ext>
-            </a:extLst>
-          </p:cNvPr>
-          <p:cNvSpPr/>
-          <p:nvPr/>
-        </p:nvSpPr>
-        <p:spPr>
-          <a:xfrm>
-            <a:off x="2815192" y="1316354"/>
-            <a:ext cx="192405" cy="161925"/>
-          </a:xfrm>
-          <a:prstGeom prst="rect">
-            <a:avLst/>
-          </a:prstGeom>
-          <a:noFill/>
-          <a:ln w="9525" cap="flat" cmpd="sng" algn="ctr">
-            <a:solidFill>
-              <a:schemeClr val="dk1"/>
-            </a:solidFill>
-            <a:prstDash val="solid"/>
-            <a:round/>
-            <a:headEnd type="none" w="med" len="med"/>
-            <a:tailEnd type="none" w="med" len="med"/>
-          </a:ln>
-        </p:spPr>
-        <p:style>
-          <a:lnRef idx="0">
-            <a:scrgbClr r="0" g="0" b="0"/>
-          </a:lnRef>
-          <a:fillRef idx="0">
-            <a:scrgbClr r="0" g="0" b="0"/>
-          </a:fillRef>
-          <a:effectRef idx="0">
-            <a:scrgbClr r="0" g="0" b="0"/>
-          </a:effectRef>
-          <a:fontRef idx="minor">
-            <a:schemeClr val="dk1"/>
-          </a:fontRef>
-        </p:style>
-        <p:txBody>
-          <a:bodyPr rtlCol="0" anchor="ctr"/>
-          <a:lstStyle/>
-          <a:p>
-            <a:pPr algn="ctr"/>
-            <a:endParaRPr lang="fr-FR"/>
-          </a:p>
-        </p:txBody>
-      </p:sp>
-      <p:sp>
-        <p:nvSpPr>
-          <p:cNvPr id="12" name="Ellipse 11">
-            <a:extLst>
-              <a:ext uri="{FF2B5EF4-FFF2-40B4-BE49-F238E27FC236}">
-                <a16:creationId xmlns:a16="http://schemas.microsoft.com/office/drawing/2014/main" id="{C3C3816A-E106-821C-C03B-E19F5929865F}"/>
-              </a:ext>
-            </a:extLst>
-          </p:cNvPr>
-          <p:cNvSpPr/>
-          <p:nvPr/>
-        </p:nvSpPr>
-        <p:spPr>
-          <a:xfrm>
-            <a:off x="2659849" y="1544439"/>
-            <a:ext cx="192405" cy="161925"/>
-          </a:xfrm>
-          <a:prstGeom prst="ellipse">
-            <a:avLst/>
-          </a:prstGeom>
-          <a:noFill/>
-          <a:ln w="9525" cap="flat" cmpd="sng" algn="ctr">
-            <a:solidFill>
-              <a:schemeClr val="dk1"/>
-            </a:solidFill>
-            <a:prstDash val="solid"/>
-            <a:round/>
-            <a:headEnd type="none" w="med" len="med"/>
-            <a:tailEnd type="none" w="med" len="med"/>
-          </a:ln>
-        </p:spPr>
-        <p:style>
-          <a:lnRef idx="0">
-            <a:scrgbClr r="0" g="0" b="0"/>
-          </a:lnRef>
-          <a:fillRef idx="0">
-            <a:scrgbClr r="0" g="0" b="0"/>
-          </a:fillRef>
-          <a:effectRef idx="0">
-            <a:scrgbClr r="0" g="0" b="0"/>
-          </a:effectRef>
-          <a:fontRef idx="minor">
-            <a:schemeClr val="dk1"/>
-          </a:fontRef>
-        </p:style>
-        <p:txBody>
-          <a:bodyPr rtlCol="0" anchor="ctr"/>
-          <a:lstStyle/>
-          <a:p>
-            <a:pPr algn="ctr"/>
-            <a:endParaRPr lang="fr-FR"/>
-          </a:p>
-        </p:txBody>
-      </p:sp>
-    </p:spTree>
-    <p:extLst>
-      <p:ext uri="{BB962C8B-B14F-4D97-AF65-F5344CB8AC3E}">
-        <p14:creationId xmlns:p14="http://schemas.microsoft.com/office/powerpoint/2010/main" val="2146471016"/>
-      </p:ext>
-    </p:extLst>
-  </p:cSld>
-  <p:clrMapOvr>
-    <a:masterClrMapping/>
-  </p:clrMapOvr>
-  <mc:AlternateContent xmlns:mc="http://schemas.openxmlformats.org/markup-compatibility/2006">
-    <mc:Choice xmlns:p14="http://schemas.microsoft.com/office/powerpoint/2010/main" Requires="p14">
-      <p:transition spd="med" p14:dur="700" advClick="0" advTm="5000">
-        <p:fade/>
-      </p:transition>
-    </mc:Choice>
-    <mc:Fallback>
-      <p:transition spd="med" advClick="0" advTm="5000">
-        <p:fade/>
-      </p:transition>
-    </mc:Fallback>
-  </mc:AlternateContent>
-  <p:timing>
-    <p:tnLst>
-      <p:par>
-        <p:cTn id="1" dur="indefinite" restart="never" nodeType="tmRoot">
-          <p:childTnLst>
-            <p:seq concurrent="1" nextAc="seek">
-              <p:cTn id="2" dur="indefinite" nodeType="mainSeq">
-                <p:childTnLst>
-                  <p:par>
-                    <p:cTn id="3" fill="hold">
-                      <p:stCondLst>
-                        <p:cond delay="indefinite"/>
-                      </p:stCondLst>
-                      <p:childTnLst>
-                        <p:par>
-                          <p:cTn id="4" fill="hold">
-                            <p:stCondLst>
-                              <p:cond delay="0"/>
-                            </p:stCondLst>
-                            <p:childTnLst>
-                              <p:par>
-                                <p:cTn id="5" presetID="10" presetClass="entr" presetSubtype="0" fill="hold" nodeType="clickEffect">
-                                  <p:stCondLst>
-                                    <p:cond delay="0"/>
-                                  </p:stCondLst>
-                                  <p:childTnLst>
-                                    <p:set>
-                                      <p:cBhvr>
-                                        <p:cTn id="6" dur="1" fill="hold">
-                                          <p:stCondLst>
-                                            <p:cond delay="0"/>
-                                          </p:stCondLst>
-                                        </p:cTn>
-                                        <p:tgtEl>
-                                          <p:spTgt spid="5122"/>
-                                        </p:tgtEl>
-                                        <p:attrNameLst>
-                                          <p:attrName>style.visibility</p:attrName>
-                                        </p:attrNameLst>
-                                      </p:cBhvr>
-                                      <p:to>
-                                        <p:strVal val="visible"/>
-                                      </p:to>
-                                    </p:set>
-                                    <p:animEffect transition="in" filter="fade">
-                                      <p:cBhvr>
-                                        <p:cTn id="7" dur="500"/>
-                                        <p:tgtEl>
-                                          <p:spTgt spid="5122"/>
-                                        </p:tgtEl>
-                                      </p:cBhvr>
-                                    </p:animEffect>
-                                  </p:childTnLst>
-                                </p:cTn>
-                              </p:par>
-                              <p:par>
-                                <p:cTn id="8" presetID="10" presetClass="entr" presetSubtype="0" fill="hold" nodeType="withEffect">
-                                  <p:stCondLst>
-                                    <p:cond delay="0"/>
-                                  </p:stCondLst>
-                                  <p:childTnLst>
-                                    <p:set>
-                                      <p:cBhvr>
-                                        <p:cTn id="9" dur="1" fill="hold">
-                                          <p:stCondLst>
-                                            <p:cond delay="0"/>
-                                          </p:stCondLst>
-                                        </p:cTn>
-                                        <p:tgtEl>
-                                          <p:spTgt spid="3"/>
-                                        </p:tgtEl>
-                                        <p:attrNameLst>
-                                          <p:attrName>style.visibility</p:attrName>
-                                        </p:attrNameLst>
-                                      </p:cBhvr>
-                                      <p:to>
-                                        <p:strVal val="visible"/>
-                                      </p:to>
-                                    </p:set>
-                                    <p:animEffect transition="in" filter="fade">
-                                      <p:cBhvr>
-                                        <p:cTn id="10" dur="500"/>
-                                        <p:tgtEl>
-                                          <p:spTgt spid="3"/>
-                                        </p:tgtEl>
-                                      </p:cBhvr>
-                                    </p:animEffect>
-                                  </p:childTnLst>
-                                </p:cTn>
-                              </p:par>
-                              <p:par>
-                                <p:cTn id="11" presetID="10" presetClass="entr" presetSubtype="0" fill="hold" nodeType="withEffect">
-                                  <p:stCondLst>
-                                    <p:cond delay="0"/>
-                                  </p:stCondLst>
-                                  <p:childTnLst>
-                                    <p:set>
-                                      <p:cBhvr>
-                                        <p:cTn id="12" dur="1" fill="hold">
-                                          <p:stCondLst>
-                                            <p:cond delay="0"/>
-                                          </p:stCondLst>
-                                        </p:cTn>
-                                        <p:tgtEl>
-                                          <p:spTgt spid="13"/>
-                                        </p:tgtEl>
-                                        <p:attrNameLst>
-                                          <p:attrName>style.visibility</p:attrName>
-                                        </p:attrNameLst>
-                                      </p:cBhvr>
-                                      <p:to>
-                                        <p:strVal val="visible"/>
-                                      </p:to>
-                                    </p:set>
-                                    <p:animEffect transition="in" filter="fade">
-                                      <p:cBhvr>
-                                        <p:cTn id="13" dur="500"/>
-                                        <p:tgtEl>
-                                          <p:spTgt spid="13"/>
-                                        </p:tgtEl>
-                                      </p:cBhvr>
-                                    </p:animEffect>
-                                  </p:childTnLst>
-                                </p:cTn>
-                              </p:par>
-                            </p:childTnLst>
-                          </p:cTn>
-                        </p:par>
-                      </p:childTnLst>
-                    </p:cTn>
-                  </p:par>
-                </p:childTnLst>
-              </p:cTn>
-              <p:prevCondLst>
-                <p:cond evt="onPrev" delay="0">
-                  <p:tgtEl>
-                    <p:sldTgt/>
-                  </p:tgtEl>
-                </p:cond>
-              </p:prevCondLst>
-              <p:nextCondLst>
-                <p:cond evt="onNext" delay="0">
-                  <p:tgtEl>
-                    <p:sldTgt/>
-                  </p:tgtEl>
-                </p:cond>
-              </p:nextCondLst>
-            </p:seq>
-          </p:childTnLst>
-        </p:cTn>
-      </p:par>
-    </p:tnLst>
-  </p:timing>
-</p:sld>
-</file>
-
-<file path=ppt/slides/slide7.xml><?xml version="1.0" encoding="utf-8"?>
-<p:sld xmlns:a="http://schemas.openxmlformats.org/drawingml/2006/main" xmlns:r="http://schemas.openxmlformats.org/officeDocument/2006/relationships" xmlns:p="http://schemas.openxmlformats.org/presentationml/2006/main">
-  <p:cSld>
-    <p:spTree>
-      <p:nvGrpSpPr>
-        <p:cNvPr id="1" name=""/>
-        <p:cNvGrpSpPr/>
-        <p:nvPr/>
-      </p:nvGrpSpPr>
-      <p:grpSpPr>
-        <a:xfrm>
-          <a:off x="0" y="0"/>
-          <a:ext cx="0" cy="0"/>
-          <a:chOff x="0" y="0"/>
-          <a:chExt cx="0" cy="0"/>
-        </a:xfrm>
-      </p:grpSpPr>
-      <p:pic>
-        <p:nvPicPr>
-          <p:cNvPr id="1032" name="Picture 8" descr="Desktop, pc, server icon - Free download on Iconfinder">
-            <a:extLst>
-              <a:ext uri="{FF2B5EF4-FFF2-40B4-BE49-F238E27FC236}">
-                <a16:creationId xmlns:a16="http://schemas.microsoft.com/office/drawing/2014/main" id="{C118CDCB-676C-D417-5BC5-40D82D1D1C1A}"/>
-              </a:ext>
-            </a:extLst>
-          </p:cNvPr>
-          <p:cNvPicPr>
-            <a:picLocks noChangeAspect="1" noChangeArrowheads="1"/>
-          </p:cNvPicPr>
-          <p:nvPr/>
-        </p:nvPicPr>
-        <p:blipFill>
-          <a:blip r:embed="rId2">
-            <a:extLst>
-              <a:ext uri="{28A0092B-C50C-407E-A947-70E740481C1C}">
-                <a14:useLocalDpi xmlns:a14="http://schemas.microsoft.com/office/drawing/2010/main" val="0"/>
-              </a:ext>
-            </a:extLst>
-          </a:blip>
-          <a:srcRect/>
-          <a:stretch>
-            <a:fillRect/>
-          </a:stretch>
-        </p:blipFill>
-        <p:spPr bwMode="auto">
-          <a:xfrm flipH="1">
-            <a:off x="5034118" y="825911"/>
-            <a:ext cx="1553496" cy="1553496"/>
-          </a:xfrm>
-          <a:prstGeom prst="rect">
-            <a:avLst/>
-          </a:prstGeom>
           <a:ln>
             <a:noFill/>
           </a:ln>
@@ -12998,47 +13767,12 @@
           </a:extLst>
         </p:spPr>
       </p:pic>
-      <p:sp>
-        <p:nvSpPr>
-          <p:cNvPr id="4" name="ZoneTexte 3">
-            <a:extLst>
-              <a:ext uri="{FF2B5EF4-FFF2-40B4-BE49-F238E27FC236}">
-                <a16:creationId xmlns:a16="http://schemas.microsoft.com/office/drawing/2014/main" id="{3E64A7C5-B4FA-8287-17FC-7114FE0AD1DD}"/>
-              </a:ext>
-            </a:extLst>
-          </p:cNvPr>
-          <p:cNvSpPr txBox="1"/>
-          <p:nvPr/>
-        </p:nvSpPr>
-        <p:spPr>
-          <a:xfrm>
-            <a:off x="6381137" y="1233328"/>
-            <a:ext cx="963561" cy="369332"/>
-          </a:xfrm>
-          <a:prstGeom prst="rect">
-            <a:avLst/>
-          </a:prstGeom>
-          <a:noFill/>
-        </p:spPr>
-        <p:txBody>
-          <a:bodyPr wrap="square" rtlCol="0">
-            <a:spAutoFit/>
-          </a:bodyPr>
-          <a:lstStyle/>
-          <a:p>
-            <a:r>
-              <a:rPr lang="fr-FR" dirty="0"/>
-              <a:t>Server</a:t>
-            </a:r>
-          </a:p>
-        </p:txBody>
-      </p:sp>
       <p:pic>
         <p:nvPicPr>
-          <p:cNvPr id="1034" name="Picture 10" descr="Ordinateur personnel - Icônes la technologie gratuites">
-            <a:extLst>
-              <a:ext uri="{FF2B5EF4-FFF2-40B4-BE49-F238E27FC236}">
-                <a16:creationId xmlns:a16="http://schemas.microsoft.com/office/drawing/2014/main" id="{52AE620C-A39B-DCD6-1F03-A2EF850DC413}"/>
+          <p:cNvPr id="3" name="Picture 2" descr="Rotation de la flèche vers la droite - Icônes flèches gratuites">
+            <a:extLst>
+              <a:ext uri="{FF2B5EF4-FFF2-40B4-BE49-F238E27FC236}">
+                <a16:creationId xmlns:a16="http://schemas.microsoft.com/office/drawing/2014/main" id="{6ED1D3C0-F1F3-6C09-0585-702277AB643C}"/>
               </a:ext>
             </a:extLst>
           </p:cNvPr>
@@ -13048,7 +13782,7 @@
           <p:nvPr/>
         </p:nvPicPr>
         <p:blipFill>
-          <a:blip r:embed="rId3">
+          <a:blip r:embed="rId4">
             <a:extLst>
               <a:ext uri="{28A0092B-C50C-407E-A947-70E740481C1C}">
                 <a14:useLocalDpi xmlns:a14="http://schemas.microsoft.com/office/drawing/2010/main" val="0"/>
@@ -13062,8 +13796,8 @@
         </p:blipFill>
         <p:spPr bwMode="auto">
           <a:xfrm>
-            <a:off x="2487562" y="3687096"/>
-            <a:ext cx="1040073" cy="1040073"/>
+            <a:off x="5783066" y="3124511"/>
+            <a:ext cx="572418" cy="572418"/>
           </a:xfrm>
           <a:prstGeom prst="rect">
             <a:avLst/>
@@ -13087,10 +13821,10 @@
       </p:pic>
       <p:pic>
         <p:nvPicPr>
-          <p:cNvPr id="5" name="Picture 10" descr="Ordinateur personnel - Icônes la technologie gratuites">
-            <a:extLst>
-              <a:ext uri="{FF2B5EF4-FFF2-40B4-BE49-F238E27FC236}">
-                <a16:creationId xmlns:a16="http://schemas.microsoft.com/office/drawing/2014/main" id="{8E965AAD-7FD8-4834-09A8-16692220330F}"/>
+          <p:cNvPr id="13" name="Picture 2" descr="Rotation de la flèche vers la droite - Icônes flèches gratuites">
+            <a:extLst>
+              <a:ext uri="{FF2B5EF4-FFF2-40B4-BE49-F238E27FC236}">
+                <a16:creationId xmlns:a16="http://schemas.microsoft.com/office/drawing/2014/main" id="{9AC311B4-F3E0-A3A9-805C-CA2AFA8C80E8}"/>
               </a:ext>
             </a:extLst>
           </p:cNvPr>
@@ -13100,7 +13834,7 @@
           <p:nvPr/>
         </p:nvPicPr>
         <p:blipFill>
-          <a:blip r:embed="rId3">
+          <a:blip r:embed="rId4">
             <a:extLst>
               <a:ext uri="{28A0092B-C50C-407E-A947-70E740481C1C}">
                 <a14:useLocalDpi xmlns:a14="http://schemas.microsoft.com/office/drawing/2010/main" val="0"/>
@@ -13114,8 +13848,8 @@
         </p:blipFill>
         <p:spPr bwMode="auto">
           <a:xfrm>
-            <a:off x="5451988" y="3687095"/>
-            <a:ext cx="1040073" cy="1040073"/>
+            <a:off x="8518579" y="3109140"/>
+            <a:ext cx="572418" cy="572418"/>
           </a:xfrm>
           <a:prstGeom prst="rect">
             <a:avLst/>
@@ -13137,457 +13871,6 @@
           </a:extLst>
         </p:spPr>
       </p:pic>
-      <p:pic>
-        <p:nvPicPr>
-          <p:cNvPr id="6" name="Picture 10" descr="Ordinateur personnel - Icônes la technologie gratuites">
-            <a:extLst>
-              <a:ext uri="{FF2B5EF4-FFF2-40B4-BE49-F238E27FC236}">
-                <a16:creationId xmlns:a16="http://schemas.microsoft.com/office/drawing/2014/main" id="{8550D24E-2906-C70E-B105-467035D5C6F6}"/>
-              </a:ext>
-            </a:extLst>
-          </p:cNvPr>
-          <p:cNvPicPr>
-            <a:picLocks noChangeAspect="1" noChangeArrowheads="1"/>
-          </p:cNvPicPr>
-          <p:nvPr/>
-        </p:nvPicPr>
-        <p:blipFill>
-          <a:blip r:embed="rId3">
-            <a:extLst>
-              <a:ext uri="{28A0092B-C50C-407E-A947-70E740481C1C}">
-                <a14:useLocalDpi xmlns:a14="http://schemas.microsoft.com/office/drawing/2010/main" val="0"/>
-              </a:ext>
-            </a:extLst>
-          </a:blip>
-          <a:srcRect/>
-          <a:stretch>
-            <a:fillRect/>
-          </a:stretch>
-        </p:blipFill>
-        <p:spPr bwMode="auto">
-          <a:xfrm>
-            <a:off x="8008375" y="3687095"/>
-            <a:ext cx="1040073" cy="1040073"/>
-          </a:xfrm>
-          <a:prstGeom prst="rect">
-            <a:avLst/>
-          </a:prstGeom>
-          <a:ln>
-            <a:noFill/>
-          </a:ln>
-          <a:effectLst>
-            <a:softEdge rad="112500"/>
-          </a:effectLst>
-          <a:extLst>
-            <a:ext uri="{909E8E84-426E-40DD-AFC4-6F175D3DCCD1}">
-              <a14:hiddenFill xmlns:a14="http://schemas.microsoft.com/office/drawing/2010/main">
-                <a:solidFill>
-                  <a:srgbClr val="FFFFFF"/>
-                </a:solidFill>
-              </a14:hiddenFill>
-            </a:ext>
-          </a:extLst>
-        </p:spPr>
-      </p:pic>
-      <p:sp>
-        <p:nvSpPr>
-          <p:cNvPr id="8" name="ZoneTexte 7">
-            <a:extLst>
-              <a:ext uri="{FF2B5EF4-FFF2-40B4-BE49-F238E27FC236}">
-                <a16:creationId xmlns:a16="http://schemas.microsoft.com/office/drawing/2014/main" id="{232FFB4D-1C0E-A007-1C41-6C80413F6C14}"/>
-              </a:ext>
-            </a:extLst>
-          </p:cNvPr>
-          <p:cNvSpPr txBox="1"/>
-          <p:nvPr/>
-        </p:nvSpPr>
-        <p:spPr>
-          <a:xfrm>
-            <a:off x="2525817" y="4727168"/>
-            <a:ext cx="963561" cy="369332"/>
-          </a:xfrm>
-          <a:prstGeom prst="rect">
-            <a:avLst/>
-          </a:prstGeom>
-          <a:noFill/>
-        </p:spPr>
-        <p:txBody>
-          <a:bodyPr wrap="square" rtlCol="0">
-            <a:spAutoFit/>
-          </a:bodyPr>
-          <a:lstStyle/>
-          <a:p>
-            <a:r>
-              <a:rPr lang="fr-FR" dirty="0"/>
-              <a:t>Client 1</a:t>
-            </a:r>
-          </a:p>
-        </p:txBody>
-      </p:sp>
-      <p:sp>
-        <p:nvSpPr>
-          <p:cNvPr id="9" name="ZoneTexte 8">
-            <a:extLst>
-              <a:ext uri="{FF2B5EF4-FFF2-40B4-BE49-F238E27FC236}">
-                <a16:creationId xmlns:a16="http://schemas.microsoft.com/office/drawing/2014/main" id="{CAF3890A-8F2B-5D69-231F-94465459472E}"/>
-              </a:ext>
-            </a:extLst>
-          </p:cNvPr>
-          <p:cNvSpPr txBox="1"/>
-          <p:nvPr/>
-        </p:nvSpPr>
-        <p:spPr>
-          <a:xfrm>
-            <a:off x="5587495" y="4727168"/>
-            <a:ext cx="963561" cy="369332"/>
-          </a:xfrm>
-          <a:prstGeom prst="rect">
-            <a:avLst/>
-          </a:prstGeom>
-          <a:noFill/>
-        </p:spPr>
-        <p:txBody>
-          <a:bodyPr wrap="square" rtlCol="0">
-            <a:spAutoFit/>
-          </a:bodyPr>
-          <a:lstStyle/>
-          <a:p>
-            <a:r>
-              <a:rPr lang="fr-FR" dirty="0"/>
-              <a:t>Client 2 </a:t>
-            </a:r>
-          </a:p>
-        </p:txBody>
-      </p:sp>
-      <p:sp>
-        <p:nvSpPr>
-          <p:cNvPr id="10" name="ZoneTexte 9">
-            <a:extLst>
-              <a:ext uri="{FF2B5EF4-FFF2-40B4-BE49-F238E27FC236}">
-                <a16:creationId xmlns:a16="http://schemas.microsoft.com/office/drawing/2014/main" id="{8B43A052-2F02-77B7-582D-C9CD76475DAD}"/>
-              </a:ext>
-            </a:extLst>
-          </p:cNvPr>
-          <p:cNvSpPr txBox="1"/>
-          <p:nvPr/>
-        </p:nvSpPr>
-        <p:spPr>
-          <a:xfrm>
-            <a:off x="8220843" y="4732705"/>
-            <a:ext cx="963561" cy="369332"/>
-          </a:xfrm>
-          <a:prstGeom prst="rect">
-            <a:avLst/>
-          </a:prstGeom>
-          <a:noFill/>
-        </p:spPr>
-        <p:txBody>
-          <a:bodyPr wrap="square" rtlCol="0">
-            <a:spAutoFit/>
-          </a:bodyPr>
-          <a:lstStyle/>
-          <a:p>
-            <a:r>
-              <a:rPr lang="fr-FR" dirty="0"/>
-              <a:t>Client 3 </a:t>
-            </a:r>
-          </a:p>
-        </p:txBody>
-      </p:sp>
-      <p:sp>
-        <p:nvSpPr>
-          <p:cNvPr id="11" name="Ellipse 10">
-            <a:extLst>
-              <a:ext uri="{FF2B5EF4-FFF2-40B4-BE49-F238E27FC236}">
-                <a16:creationId xmlns:a16="http://schemas.microsoft.com/office/drawing/2014/main" id="{A0D39E08-CCF8-80C6-0B65-3F0D4D8200B6}"/>
-              </a:ext>
-            </a:extLst>
-          </p:cNvPr>
-          <p:cNvSpPr/>
-          <p:nvPr/>
-        </p:nvSpPr>
-        <p:spPr>
-          <a:xfrm>
-            <a:off x="2163095" y="3588772"/>
-            <a:ext cx="265472" cy="235974"/>
-          </a:xfrm>
-          <a:prstGeom prst="ellipse">
-            <a:avLst/>
-          </a:prstGeom>
-        </p:spPr>
-        <p:style>
-          <a:lnRef idx="2">
-            <a:schemeClr val="accent4">
-              <a:shade val="15000"/>
-            </a:schemeClr>
-          </a:lnRef>
-          <a:fillRef idx="1">
-            <a:schemeClr val="accent4"/>
-          </a:fillRef>
-          <a:effectRef idx="0">
-            <a:schemeClr val="accent4"/>
-          </a:effectRef>
-          <a:fontRef idx="minor">
-            <a:schemeClr val="lt1"/>
-          </a:fontRef>
-        </p:style>
-        <p:txBody>
-          <a:bodyPr rtlCol="0" anchor="ctr"/>
-          <a:lstStyle/>
-          <a:p>
-            <a:pPr algn="ctr"/>
-            <a:endParaRPr lang="fr-FR"/>
-          </a:p>
-        </p:txBody>
-      </p:sp>
-      <p:sp>
-        <p:nvSpPr>
-          <p:cNvPr id="14" name="Ellipse 13">
-            <a:extLst>
-              <a:ext uri="{FF2B5EF4-FFF2-40B4-BE49-F238E27FC236}">
-                <a16:creationId xmlns:a16="http://schemas.microsoft.com/office/drawing/2014/main" id="{4C9159B3-38AA-1B52-0DAD-AEB413E2DE82}"/>
-              </a:ext>
-            </a:extLst>
-          </p:cNvPr>
-          <p:cNvSpPr/>
-          <p:nvPr/>
-        </p:nvSpPr>
-        <p:spPr>
-          <a:xfrm>
-            <a:off x="5127521" y="3578942"/>
-            <a:ext cx="265472" cy="235974"/>
-          </a:xfrm>
-          <a:prstGeom prst="ellipse">
-            <a:avLst/>
-          </a:prstGeom>
-        </p:spPr>
-        <p:style>
-          <a:lnRef idx="2">
-            <a:schemeClr val="accent6">
-              <a:shade val="15000"/>
-            </a:schemeClr>
-          </a:lnRef>
-          <a:fillRef idx="1">
-            <a:schemeClr val="accent6"/>
-          </a:fillRef>
-          <a:effectRef idx="0">
-            <a:schemeClr val="accent6"/>
-          </a:effectRef>
-          <a:fontRef idx="minor">
-            <a:schemeClr val="lt1"/>
-          </a:fontRef>
-        </p:style>
-        <p:txBody>
-          <a:bodyPr rtlCol="0" anchor="ctr"/>
-          <a:lstStyle/>
-          <a:p>
-            <a:pPr algn="ctr"/>
-            <a:endParaRPr lang="fr-FR"/>
-          </a:p>
-        </p:txBody>
-      </p:sp>
-      <p:sp>
-        <p:nvSpPr>
-          <p:cNvPr id="15" name="Ellipse 14">
-            <a:extLst>
-              <a:ext uri="{FF2B5EF4-FFF2-40B4-BE49-F238E27FC236}">
-                <a16:creationId xmlns:a16="http://schemas.microsoft.com/office/drawing/2014/main" id="{13FF271B-FBC5-DF99-61CA-43FB4A1757AA}"/>
-              </a:ext>
-            </a:extLst>
-          </p:cNvPr>
-          <p:cNvSpPr/>
-          <p:nvPr/>
-        </p:nvSpPr>
-        <p:spPr>
-          <a:xfrm>
-            <a:off x="7683909" y="3588772"/>
-            <a:ext cx="265471" cy="235974"/>
-          </a:xfrm>
-          <a:prstGeom prst="ellipse">
-            <a:avLst/>
-          </a:prstGeom>
-        </p:spPr>
-        <p:style>
-          <a:lnRef idx="2">
-            <a:schemeClr val="accent2">
-              <a:shade val="15000"/>
-            </a:schemeClr>
-          </a:lnRef>
-          <a:fillRef idx="1">
-            <a:schemeClr val="accent2"/>
-          </a:fillRef>
-          <a:effectRef idx="0">
-            <a:schemeClr val="accent2"/>
-          </a:effectRef>
-          <a:fontRef idx="minor">
-            <a:schemeClr val="lt1"/>
-          </a:fontRef>
-        </p:style>
-        <p:txBody>
-          <a:bodyPr rtlCol="0" anchor="ctr"/>
-          <a:lstStyle/>
-          <a:p>
-            <a:pPr algn="ctr"/>
-            <a:endParaRPr lang="fr-FR"/>
-          </a:p>
-        </p:txBody>
-      </p:sp>
-      <p:pic>
-        <p:nvPicPr>
-          <p:cNvPr id="5122" name="Picture 2" descr="Rotation de la flèche vers la droite - Icônes flèches gratuites">
-            <a:extLst>
-              <a:ext uri="{FF2B5EF4-FFF2-40B4-BE49-F238E27FC236}">
-                <a16:creationId xmlns:a16="http://schemas.microsoft.com/office/drawing/2014/main" id="{3A4F140A-3083-C34F-13EE-696E44880C23}"/>
-              </a:ext>
-            </a:extLst>
-          </p:cNvPr>
-          <p:cNvPicPr>
-            <a:picLocks noChangeAspect="1" noChangeArrowheads="1"/>
-          </p:cNvPicPr>
-          <p:nvPr/>
-        </p:nvPicPr>
-        <p:blipFill>
-          <a:blip r:embed="rId4">
-            <a:extLst>
-              <a:ext uri="{28A0092B-C50C-407E-A947-70E740481C1C}">
-                <a14:useLocalDpi xmlns:a14="http://schemas.microsoft.com/office/drawing/2010/main" val="0"/>
-              </a:ext>
-            </a:extLst>
-          </a:blip>
-          <a:srcRect/>
-          <a:stretch>
-            <a:fillRect/>
-          </a:stretch>
-        </p:blipFill>
-        <p:spPr bwMode="auto">
-          <a:xfrm>
-            <a:off x="2759645" y="3124511"/>
-            <a:ext cx="572418" cy="572418"/>
-          </a:xfrm>
-          <a:prstGeom prst="rect">
-            <a:avLst/>
-          </a:prstGeom>
-          <a:ln>
-            <a:noFill/>
-          </a:ln>
-          <a:effectLst>
-            <a:softEdge rad="112500"/>
-          </a:effectLst>
-          <a:extLst>
-            <a:ext uri="{909E8E84-426E-40DD-AFC4-6F175D3DCCD1}">
-              <a14:hiddenFill xmlns:a14="http://schemas.microsoft.com/office/drawing/2010/main">
-                <a:solidFill>
-                  <a:srgbClr val="FFFFFF"/>
-                </a:solidFill>
-              </a14:hiddenFill>
-            </a:ext>
-          </a:extLst>
-        </p:spPr>
-      </p:pic>
-      <p:pic>
-        <p:nvPicPr>
-          <p:cNvPr id="3" name="Picture 2" descr="Rotation de la flèche vers la droite - Icônes flèches gratuites">
-            <a:extLst>
-              <a:ext uri="{FF2B5EF4-FFF2-40B4-BE49-F238E27FC236}">
-                <a16:creationId xmlns:a16="http://schemas.microsoft.com/office/drawing/2014/main" id="{6ED1D3C0-F1F3-6C09-0585-702277AB643C}"/>
-              </a:ext>
-            </a:extLst>
-          </p:cNvPr>
-          <p:cNvPicPr>
-            <a:picLocks noChangeAspect="1" noChangeArrowheads="1"/>
-          </p:cNvPicPr>
-          <p:nvPr/>
-        </p:nvPicPr>
-        <p:blipFill>
-          <a:blip r:embed="rId4">
-            <a:extLst>
-              <a:ext uri="{28A0092B-C50C-407E-A947-70E740481C1C}">
-                <a14:useLocalDpi xmlns:a14="http://schemas.microsoft.com/office/drawing/2010/main" val="0"/>
-              </a:ext>
-            </a:extLst>
-          </a:blip>
-          <a:srcRect/>
-          <a:stretch>
-            <a:fillRect/>
-          </a:stretch>
-        </p:blipFill>
-        <p:spPr bwMode="auto">
-          <a:xfrm>
-            <a:off x="5783066" y="3124511"/>
-            <a:ext cx="572418" cy="572418"/>
-          </a:xfrm>
-          <a:prstGeom prst="rect">
-            <a:avLst/>
-          </a:prstGeom>
-          <a:ln>
-            <a:noFill/>
-          </a:ln>
-          <a:effectLst>
-            <a:softEdge rad="112500"/>
-          </a:effectLst>
-          <a:extLst>
-            <a:ext uri="{909E8E84-426E-40DD-AFC4-6F175D3DCCD1}">
-              <a14:hiddenFill xmlns:a14="http://schemas.microsoft.com/office/drawing/2010/main">
-                <a:solidFill>
-                  <a:srgbClr val="FFFFFF"/>
-                </a:solidFill>
-              </a14:hiddenFill>
-            </a:ext>
-          </a:extLst>
-        </p:spPr>
-      </p:pic>
-      <p:pic>
-        <p:nvPicPr>
-          <p:cNvPr id="13" name="Picture 2" descr="Rotation de la flèche vers la droite - Icônes flèches gratuites">
-            <a:extLst>
-              <a:ext uri="{FF2B5EF4-FFF2-40B4-BE49-F238E27FC236}">
-                <a16:creationId xmlns:a16="http://schemas.microsoft.com/office/drawing/2014/main" id="{9AC311B4-F3E0-A3A9-805C-CA2AFA8C80E8}"/>
-              </a:ext>
-            </a:extLst>
-          </p:cNvPr>
-          <p:cNvPicPr>
-            <a:picLocks noChangeAspect="1" noChangeArrowheads="1"/>
-          </p:cNvPicPr>
-          <p:nvPr/>
-        </p:nvPicPr>
-        <p:blipFill>
-          <a:blip r:embed="rId4">
-            <a:extLst>
-              <a:ext uri="{28A0092B-C50C-407E-A947-70E740481C1C}">
-                <a14:useLocalDpi xmlns:a14="http://schemas.microsoft.com/office/drawing/2010/main" val="0"/>
-              </a:ext>
-            </a:extLst>
-          </a:blip>
-          <a:srcRect/>
-          <a:stretch>
-            <a:fillRect/>
-          </a:stretch>
-        </p:blipFill>
-        <p:spPr bwMode="auto">
-          <a:xfrm>
-            <a:off x="8518579" y="3109140"/>
-            <a:ext cx="572418" cy="572418"/>
-          </a:xfrm>
-          <a:prstGeom prst="rect">
-            <a:avLst/>
-          </a:prstGeom>
-          <a:ln>
-            <a:noFill/>
-          </a:ln>
-          <a:effectLst>
-            <a:softEdge rad="112500"/>
-          </a:effectLst>
-          <a:extLst>
-            <a:ext uri="{909E8E84-426E-40DD-AFC4-6F175D3DCCD1}">
-              <a14:hiddenFill xmlns:a14="http://schemas.microsoft.com/office/drawing/2010/main">
-                <a:solidFill>
-                  <a:srgbClr val="FFFFFF"/>
-                </a:solidFill>
-              </a14:hiddenFill>
-            </a:ext>
-          </a:extLst>
-        </p:spPr>
-      </p:pic>
       <p:sp>
         <p:nvSpPr>
           <p:cNvPr id="2" name="ZoneTexte 1">
@@ -13788,13 +14071,13 @@
   <p:clrMapOvr>
     <a:masterClrMapping/>
   </p:clrMapOvr>
-  <mc:AlternateContent xmlns:mc="http://schemas.openxmlformats.org/markup-compatibility/2006">
-    <mc:Choice xmlns:p14="http://schemas.microsoft.com/office/powerpoint/2010/main" Requires="p14">
+  <mc:AlternateContent xmlns:mc="http://schemas.openxmlformats.org/markup-compatibility/2006" xmlns:p14="http://schemas.microsoft.com/office/powerpoint/2010/main">
+    <mc:Choice Requires="p14">
       <p:transition spd="med" p14:dur="700" advClick="0" advTm="8000">
         <p:fade/>
       </p:transition>
     </mc:Choice>
-    <mc:Fallback>
+    <mc:Fallback xmlns="">
       <p:transition spd="med" advClick="0" advTm="8000">
         <p:fade/>
       </p:transition>
@@ -13999,6 +14282,961 @@
     <p:bldLst>
       <p:bldP spid="2" grpId="0"/>
     </p:bldLst>
+  </p:timing>
+</p:sld>
+</file>
+
+<file path=ppt/slides/slide7.xml><?xml version="1.0" encoding="utf-8"?>
+<p:sld xmlns:a="http://schemas.openxmlformats.org/drawingml/2006/main" xmlns:r="http://schemas.openxmlformats.org/officeDocument/2006/relationships" xmlns:p="http://schemas.openxmlformats.org/presentationml/2006/main">
+  <p:cSld>
+    <p:spTree>
+      <p:nvGrpSpPr>
+        <p:cNvPr id="1" name=""/>
+        <p:cNvGrpSpPr/>
+        <p:nvPr/>
+      </p:nvGrpSpPr>
+      <p:grpSpPr>
+        <a:xfrm>
+          <a:off x="0" y="0"/>
+          <a:ext cx="0" cy="0"/>
+          <a:chOff x="0" y="0"/>
+          <a:chExt cx="0" cy="0"/>
+        </a:xfrm>
+      </p:grpSpPr>
+      <p:pic>
+        <p:nvPicPr>
+          <p:cNvPr id="1032" name="Picture 8" descr="Desktop, pc, server icon - Free download on Iconfinder">
+            <a:extLst>
+              <a:ext uri="{FF2B5EF4-FFF2-40B4-BE49-F238E27FC236}">
+                <a16:creationId xmlns:a16="http://schemas.microsoft.com/office/drawing/2014/main" id="{C118CDCB-676C-D417-5BC5-40D82D1D1C1A}"/>
+              </a:ext>
+            </a:extLst>
+          </p:cNvPr>
+          <p:cNvPicPr>
+            <a:picLocks noChangeAspect="1" noChangeArrowheads="1"/>
+          </p:cNvPicPr>
+          <p:nvPr/>
+        </p:nvPicPr>
+        <p:blipFill>
+          <a:blip r:embed="rId2">
+            <a:extLst>
+              <a:ext uri="{28A0092B-C50C-407E-A947-70E740481C1C}">
+                <a14:useLocalDpi xmlns:a14="http://schemas.microsoft.com/office/drawing/2010/main" val="0"/>
+              </a:ext>
+            </a:extLst>
+          </a:blip>
+          <a:srcRect/>
+          <a:stretch>
+            <a:fillRect/>
+          </a:stretch>
+        </p:blipFill>
+        <p:spPr bwMode="auto">
+          <a:xfrm flipH="1">
+            <a:off x="5034118" y="825911"/>
+            <a:ext cx="1553496" cy="1553496"/>
+          </a:xfrm>
+          <a:prstGeom prst="rect">
+            <a:avLst/>
+          </a:prstGeom>
+          <a:noFill/>
+          <a:extLst>
+            <a:ext uri="{909E8E84-426E-40DD-AFC4-6F175D3DCCD1}">
+              <a14:hiddenFill xmlns:a14="http://schemas.microsoft.com/office/drawing/2010/main">
+                <a:solidFill>
+                  <a:srgbClr val="FFFFFF"/>
+                </a:solidFill>
+              </a14:hiddenFill>
+            </a:ext>
+          </a:extLst>
+        </p:spPr>
+      </p:pic>
+      <p:sp>
+        <p:nvSpPr>
+          <p:cNvPr id="4" name="ZoneTexte 3">
+            <a:extLst>
+              <a:ext uri="{FF2B5EF4-FFF2-40B4-BE49-F238E27FC236}">
+                <a16:creationId xmlns:a16="http://schemas.microsoft.com/office/drawing/2014/main" id="{3E64A7C5-B4FA-8287-17FC-7114FE0AD1DD}"/>
+              </a:ext>
+            </a:extLst>
+          </p:cNvPr>
+          <p:cNvSpPr txBox="1"/>
+          <p:nvPr/>
+        </p:nvSpPr>
+        <p:spPr>
+          <a:xfrm>
+            <a:off x="6381137" y="1233328"/>
+            <a:ext cx="963561" cy="369332"/>
+          </a:xfrm>
+          <a:prstGeom prst="rect">
+            <a:avLst/>
+          </a:prstGeom>
+          <a:noFill/>
+        </p:spPr>
+        <p:txBody>
+          <a:bodyPr wrap="square" rtlCol="0">
+            <a:spAutoFit/>
+          </a:bodyPr>
+          <a:lstStyle/>
+          <a:p>
+            <a:r>
+              <a:rPr lang="fr-FR" dirty="0"/>
+              <a:t>Server</a:t>
+            </a:r>
+          </a:p>
+        </p:txBody>
+      </p:sp>
+      <p:pic>
+        <p:nvPicPr>
+          <p:cNvPr id="1034" name="Picture 10" descr="Ordinateur personnel - Icônes la technologie gratuites">
+            <a:extLst>
+              <a:ext uri="{FF2B5EF4-FFF2-40B4-BE49-F238E27FC236}">
+                <a16:creationId xmlns:a16="http://schemas.microsoft.com/office/drawing/2014/main" id="{52AE620C-A39B-DCD6-1F03-A2EF850DC413}"/>
+              </a:ext>
+            </a:extLst>
+          </p:cNvPr>
+          <p:cNvPicPr>
+            <a:picLocks noChangeAspect="1" noChangeArrowheads="1"/>
+          </p:cNvPicPr>
+          <p:nvPr/>
+        </p:nvPicPr>
+        <p:blipFill>
+          <a:blip r:embed="rId3">
+            <a:extLst>
+              <a:ext uri="{28A0092B-C50C-407E-A947-70E740481C1C}">
+                <a14:useLocalDpi xmlns:a14="http://schemas.microsoft.com/office/drawing/2010/main" val="0"/>
+              </a:ext>
+            </a:extLst>
+          </a:blip>
+          <a:srcRect/>
+          <a:stretch>
+            <a:fillRect/>
+          </a:stretch>
+        </p:blipFill>
+        <p:spPr bwMode="auto">
+          <a:xfrm>
+            <a:off x="2487562" y="3687096"/>
+            <a:ext cx="1040073" cy="1040073"/>
+          </a:xfrm>
+          <a:prstGeom prst="rect">
+            <a:avLst/>
+          </a:prstGeom>
+          <a:noFill/>
+          <a:extLst>
+            <a:ext uri="{909E8E84-426E-40DD-AFC4-6F175D3DCCD1}">
+              <a14:hiddenFill xmlns:a14="http://schemas.microsoft.com/office/drawing/2010/main">
+                <a:solidFill>
+                  <a:srgbClr val="FFFFFF"/>
+                </a:solidFill>
+              </a14:hiddenFill>
+            </a:ext>
+          </a:extLst>
+        </p:spPr>
+      </p:pic>
+      <p:pic>
+        <p:nvPicPr>
+          <p:cNvPr id="5" name="Picture 10" descr="Ordinateur personnel - Icônes la technologie gratuites">
+            <a:extLst>
+              <a:ext uri="{FF2B5EF4-FFF2-40B4-BE49-F238E27FC236}">
+                <a16:creationId xmlns:a16="http://schemas.microsoft.com/office/drawing/2014/main" id="{8E965AAD-7FD8-4834-09A8-16692220330F}"/>
+              </a:ext>
+            </a:extLst>
+          </p:cNvPr>
+          <p:cNvPicPr>
+            <a:picLocks noChangeAspect="1" noChangeArrowheads="1"/>
+          </p:cNvPicPr>
+          <p:nvPr/>
+        </p:nvPicPr>
+        <p:blipFill>
+          <a:blip r:embed="rId3">
+            <a:extLst>
+              <a:ext uri="{28A0092B-C50C-407E-A947-70E740481C1C}">
+                <a14:useLocalDpi xmlns:a14="http://schemas.microsoft.com/office/drawing/2010/main" val="0"/>
+              </a:ext>
+            </a:extLst>
+          </a:blip>
+          <a:srcRect/>
+          <a:stretch>
+            <a:fillRect/>
+          </a:stretch>
+        </p:blipFill>
+        <p:spPr bwMode="auto">
+          <a:xfrm>
+            <a:off x="5451988" y="3687095"/>
+            <a:ext cx="1040073" cy="1040073"/>
+          </a:xfrm>
+          <a:prstGeom prst="rect">
+            <a:avLst/>
+          </a:prstGeom>
+          <a:noFill/>
+          <a:extLst>
+            <a:ext uri="{909E8E84-426E-40DD-AFC4-6F175D3DCCD1}">
+              <a14:hiddenFill xmlns:a14="http://schemas.microsoft.com/office/drawing/2010/main">
+                <a:solidFill>
+                  <a:srgbClr val="FFFFFF"/>
+                </a:solidFill>
+              </a14:hiddenFill>
+            </a:ext>
+          </a:extLst>
+        </p:spPr>
+      </p:pic>
+      <p:pic>
+        <p:nvPicPr>
+          <p:cNvPr id="6" name="Picture 10" descr="Ordinateur personnel - Icônes la technologie gratuites">
+            <a:extLst>
+              <a:ext uri="{FF2B5EF4-FFF2-40B4-BE49-F238E27FC236}">
+                <a16:creationId xmlns:a16="http://schemas.microsoft.com/office/drawing/2014/main" id="{8550D24E-2906-C70E-B105-467035D5C6F6}"/>
+              </a:ext>
+            </a:extLst>
+          </p:cNvPr>
+          <p:cNvPicPr>
+            <a:picLocks noChangeAspect="1" noChangeArrowheads="1"/>
+          </p:cNvPicPr>
+          <p:nvPr/>
+        </p:nvPicPr>
+        <p:blipFill>
+          <a:blip r:embed="rId3">
+            <a:extLst>
+              <a:ext uri="{28A0092B-C50C-407E-A947-70E740481C1C}">
+                <a14:useLocalDpi xmlns:a14="http://schemas.microsoft.com/office/drawing/2010/main" val="0"/>
+              </a:ext>
+            </a:extLst>
+          </a:blip>
+          <a:srcRect/>
+          <a:stretch>
+            <a:fillRect/>
+          </a:stretch>
+        </p:blipFill>
+        <p:spPr bwMode="auto">
+          <a:xfrm>
+            <a:off x="8008375" y="3687095"/>
+            <a:ext cx="1040073" cy="1040073"/>
+          </a:xfrm>
+          <a:prstGeom prst="rect">
+            <a:avLst/>
+          </a:prstGeom>
+          <a:noFill/>
+          <a:extLst>
+            <a:ext uri="{909E8E84-426E-40DD-AFC4-6F175D3DCCD1}">
+              <a14:hiddenFill xmlns:a14="http://schemas.microsoft.com/office/drawing/2010/main">
+                <a:solidFill>
+                  <a:srgbClr val="FFFFFF"/>
+                </a:solidFill>
+              </a14:hiddenFill>
+            </a:ext>
+          </a:extLst>
+        </p:spPr>
+      </p:pic>
+      <p:sp>
+        <p:nvSpPr>
+          <p:cNvPr id="8" name="ZoneTexte 7">
+            <a:extLst>
+              <a:ext uri="{FF2B5EF4-FFF2-40B4-BE49-F238E27FC236}">
+                <a16:creationId xmlns:a16="http://schemas.microsoft.com/office/drawing/2014/main" id="{232FFB4D-1C0E-A007-1C41-6C80413F6C14}"/>
+              </a:ext>
+            </a:extLst>
+          </p:cNvPr>
+          <p:cNvSpPr txBox="1"/>
+          <p:nvPr/>
+        </p:nvSpPr>
+        <p:spPr>
+          <a:xfrm>
+            <a:off x="2525817" y="4727168"/>
+            <a:ext cx="963561" cy="369332"/>
+          </a:xfrm>
+          <a:prstGeom prst="rect">
+            <a:avLst/>
+          </a:prstGeom>
+          <a:noFill/>
+        </p:spPr>
+        <p:txBody>
+          <a:bodyPr wrap="square" rtlCol="0">
+            <a:spAutoFit/>
+          </a:bodyPr>
+          <a:lstStyle/>
+          <a:p>
+            <a:r>
+              <a:rPr lang="fr-FR" dirty="0"/>
+              <a:t>Client 1</a:t>
+            </a:r>
+          </a:p>
+        </p:txBody>
+      </p:sp>
+      <p:sp>
+        <p:nvSpPr>
+          <p:cNvPr id="9" name="ZoneTexte 8">
+            <a:extLst>
+              <a:ext uri="{FF2B5EF4-FFF2-40B4-BE49-F238E27FC236}">
+                <a16:creationId xmlns:a16="http://schemas.microsoft.com/office/drawing/2014/main" id="{CAF3890A-8F2B-5D69-231F-94465459472E}"/>
+              </a:ext>
+            </a:extLst>
+          </p:cNvPr>
+          <p:cNvSpPr txBox="1"/>
+          <p:nvPr/>
+        </p:nvSpPr>
+        <p:spPr>
+          <a:xfrm>
+            <a:off x="5587495" y="4727168"/>
+            <a:ext cx="963561" cy="369332"/>
+          </a:xfrm>
+          <a:prstGeom prst="rect">
+            <a:avLst/>
+          </a:prstGeom>
+          <a:noFill/>
+        </p:spPr>
+        <p:txBody>
+          <a:bodyPr wrap="square" rtlCol="0">
+            <a:spAutoFit/>
+          </a:bodyPr>
+          <a:lstStyle/>
+          <a:p>
+            <a:r>
+              <a:rPr lang="fr-FR" dirty="0"/>
+              <a:t>Client 2 </a:t>
+            </a:r>
+          </a:p>
+        </p:txBody>
+      </p:sp>
+      <p:sp>
+        <p:nvSpPr>
+          <p:cNvPr id="10" name="ZoneTexte 9">
+            <a:extLst>
+              <a:ext uri="{FF2B5EF4-FFF2-40B4-BE49-F238E27FC236}">
+                <a16:creationId xmlns:a16="http://schemas.microsoft.com/office/drawing/2014/main" id="{8B43A052-2F02-77B7-582D-C9CD76475DAD}"/>
+              </a:ext>
+            </a:extLst>
+          </p:cNvPr>
+          <p:cNvSpPr txBox="1"/>
+          <p:nvPr/>
+        </p:nvSpPr>
+        <p:spPr>
+          <a:xfrm>
+            <a:off x="8220843" y="4732705"/>
+            <a:ext cx="963561" cy="369332"/>
+          </a:xfrm>
+          <a:prstGeom prst="rect">
+            <a:avLst/>
+          </a:prstGeom>
+          <a:noFill/>
+        </p:spPr>
+        <p:txBody>
+          <a:bodyPr wrap="square" rtlCol="0">
+            <a:spAutoFit/>
+          </a:bodyPr>
+          <a:lstStyle/>
+          <a:p>
+            <a:r>
+              <a:rPr lang="fr-FR" dirty="0"/>
+              <a:t>Client 3 </a:t>
+            </a:r>
+          </a:p>
+        </p:txBody>
+      </p:sp>
+      <p:sp>
+        <p:nvSpPr>
+          <p:cNvPr id="11" name="Ellipse 10">
+            <a:extLst>
+              <a:ext uri="{FF2B5EF4-FFF2-40B4-BE49-F238E27FC236}">
+                <a16:creationId xmlns:a16="http://schemas.microsoft.com/office/drawing/2014/main" id="{A0D39E08-CCF8-80C6-0B65-3F0D4D8200B6}"/>
+              </a:ext>
+            </a:extLst>
+          </p:cNvPr>
+          <p:cNvSpPr/>
+          <p:nvPr/>
+        </p:nvSpPr>
+        <p:spPr>
+          <a:xfrm>
+            <a:off x="2163095" y="3588772"/>
+            <a:ext cx="265472" cy="235974"/>
+          </a:xfrm>
+          <a:prstGeom prst="ellipse">
+            <a:avLst/>
+          </a:prstGeom>
+        </p:spPr>
+        <p:style>
+          <a:lnRef idx="2">
+            <a:schemeClr val="accent4">
+              <a:shade val="15000"/>
+            </a:schemeClr>
+          </a:lnRef>
+          <a:fillRef idx="1">
+            <a:schemeClr val="accent4"/>
+          </a:fillRef>
+          <a:effectRef idx="0">
+            <a:schemeClr val="accent4"/>
+          </a:effectRef>
+          <a:fontRef idx="minor">
+            <a:schemeClr val="lt1"/>
+          </a:fontRef>
+        </p:style>
+        <p:txBody>
+          <a:bodyPr rtlCol="0" anchor="ctr"/>
+          <a:lstStyle/>
+          <a:p>
+            <a:pPr algn="ctr"/>
+            <a:endParaRPr lang="fr-FR"/>
+          </a:p>
+        </p:txBody>
+      </p:sp>
+      <p:sp>
+        <p:nvSpPr>
+          <p:cNvPr id="14" name="Ellipse 13">
+            <a:extLst>
+              <a:ext uri="{FF2B5EF4-FFF2-40B4-BE49-F238E27FC236}">
+                <a16:creationId xmlns:a16="http://schemas.microsoft.com/office/drawing/2014/main" id="{4C9159B3-38AA-1B52-0DAD-AEB413E2DE82}"/>
+              </a:ext>
+            </a:extLst>
+          </p:cNvPr>
+          <p:cNvSpPr/>
+          <p:nvPr/>
+        </p:nvSpPr>
+        <p:spPr>
+          <a:xfrm>
+            <a:off x="5127521" y="3578942"/>
+            <a:ext cx="265472" cy="235974"/>
+          </a:xfrm>
+          <a:prstGeom prst="ellipse">
+            <a:avLst/>
+          </a:prstGeom>
+        </p:spPr>
+        <p:style>
+          <a:lnRef idx="2">
+            <a:schemeClr val="accent6">
+              <a:shade val="15000"/>
+            </a:schemeClr>
+          </a:lnRef>
+          <a:fillRef idx="1">
+            <a:schemeClr val="accent6"/>
+          </a:fillRef>
+          <a:effectRef idx="0">
+            <a:schemeClr val="accent6"/>
+          </a:effectRef>
+          <a:fontRef idx="minor">
+            <a:schemeClr val="lt1"/>
+          </a:fontRef>
+        </p:style>
+        <p:txBody>
+          <a:bodyPr rtlCol="0" anchor="ctr"/>
+          <a:lstStyle/>
+          <a:p>
+            <a:pPr algn="ctr"/>
+            <a:endParaRPr lang="fr-FR"/>
+          </a:p>
+        </p:txBody>
+      </p:sp>
+      <p:sp>
+        <p:nvSpPr>
+          <p:cNvPr id="15" name="Ellipse 14">
+            <a:extLst>
+              <a:ext uri="{FF2B5EF4-FFF2-40B4-BE49-F238E27FC236}">
+                <a16:creationId xmlns:a16="http://schemas.microsoft.com/office/drawing/2014/main" id="{13FF271B-FBC5-DF99-61CA-43FB4A1757AA}"/>
+              </a:ext>
+            </a:extLst>
+          </p:cNvPr>
+          <p:cNvSpPr/>
+          <p:nvPr/>
+        </p:nvSpPr>
+        <p:spPr>
+          <a:xfrm>
+            <a:off x="7683909" y="3588772"/>
+            <a:ext cx="265471" cy="235974"/>
+          </a:xfrm>
+          <a:prstGeom prst="ellipse">
+            <a:avLst/>
+          </a:prstGeom>
+        </p:spPr>
+        <p:style>
+          <a:lnRef idx="2">
+            <a:schemeClr val="accent2">
+              <a:shade val="15000"/>
+            </a:schemeClr>
+          </a:lnRef>
+          <a:fillRef idx="1">
+            <a:schemeClr val="accent2"/>
+          </a:fillRef>
+          <a:effectRef idx="0">
+            <a:schemeClr val="accent2"/>
+          </a:effectRef>
+          <a:fontRef idx="minor">
+            <a:schemeClr val="lt1"/>
+          </a:fontRef>
+        </p:style>
+        <p:txBody>
+          <a:bodyPr rtlCol="0" anchor="ctr"/>
+          <a:lstStyle/>
+          <a:p>
+            <a:pPr algn="ctr"/>
+            <a:endParaRPr lang="fr-FR"/>
+          </a:p>
+        </p:txBody>
+      </p:sp>
+      <p:pic>
+        <p:nvPicPr>
+          <p:cNvPr id="5122" name="Picture 2" descr="Rotation de la flèche vers la droite - Icônes flèches gratuites">
+            <a:extLst>
+              <a:ext uri="{FF2B5EF4-FFF2-40B4-BE49-F238E27FC236}">
+                <a16:creationId xmlns:a16="http://schemas.microsoft.com/office/drawing/2014/main" id="{3A4F140A-3083-C34F-13EE-696E44880C23}"/>
+              </a:ext>
+            </a:extLst>
+          </p:cNvPr>
+          <p:cNvPicPr>
+            <a:picLocks noChangeAspect="1" noChangeArrowheads="1"/>
+          </p:cNvPicPr>
+          <p:nvPr/>
+        </p:nvPicPr>
+        <p:blipFill>
+          <a:blip r:embed="rId4">
+            <a:extLst>
+              <a:ext uri="{28A0092B-C50C-407E-A947-70E740481C1C}">
+                <a14:useLocalDpi xmlns:a14="http://schemas.microsoft.com/office/drawing/2010/main" val="0"/>
+              </a:ext>
+            </a:extLst>
+          </a:blip>
+          <a:srcRect/>
+          <a:stretch>
+            <a:fillRect/>
+          </a:stretch>
+        </p:blipFill>
+        <p:spPr bwMode="auto">
+          <a:xfrm>
+            <a:off x="2759645" y="3124511"/>
+            <a:ext cx="572418" cy="572418"/>
+          </a:xfrm>
+          <a:prstGeom prst="rect">
+            <a:avLst/>
+          </a:prstGeom>
+          <a:noFill/>
+          <a:extLst>
+            <a:ext uri="{909E8E84-426E-40DD-AFC4-6F175D3DCCD1}">
+              <a14:hiddenFill xmlns:a14="http://schemas.microsoft.com/office/drawing/2010/main">
+                <a:solidFill>
+                  <a:srgbClr val="FFFFFF"/>
+                </a:solidFill>
+              </a14:hiddenFill>
+            </a:ext>
+          </a:extLst>
+        </p:spPr>
+      </p:pic>
+      <p:pic>
+        <p:nvPicPr>
+          <p:cNvPr id="3" name="Picture 2" descr="Rotation de la flèche vers la droite - Icônes flèches gratuites">
+            <a:extLst>
+              <a:ext uri="{FF2B5EF4-FFF2-40B4-BE49-F238E27FC236}">
+                <a16:creationId xmlns:a16="http://schemas.microsoft.com/office/drawing/2014/main" id="{6ED1D3C0-F1F3-6C09-0585-702277AB643C}"/>
+              </a:ext>
+            </a:extLst>
+          </p:cNvPr>
+          <p:cNvPicPr>
+            <a:picLocks noChangeAspect="1" noChangeArrowheads="1"/>
+          </p:cNvPicPr>
+          <p:nvPr/>
+        </p:nvPicPr>
+        <p:blipFill>
+          <a:blip r:embed="rId4">
+            <a:extLst>
+              <a:ext uri="{28A0092B-C50C-407E-A947-70E740481C1C}">
+                <a14:useLocalDpi xmlns:a14="http://schemas.microsoft.com/office/drawing/2010/main" val="0"/>
+              </a:ext>
+            </a:extLst>
+          </a:blip>
+          <a:srcRect/>
+          <a:stretch>
+            <a:fillRect/>
+          </a:stretch>
+        </p:blipFill>
+        <p:spPr bwMode="auto">
+          <a:xfrm>
+            <a:off x="5783066" y="3124511"/>
+            <a:ext cx="572418" cy="572418"/>
+          </a:xfrm>
+          <a:prstGeom prst="rect">
+            <a:avLst/>
+          </a:prstGeom>
+          <a:noFill/>
+          <a:extLst>
+            <a:ext uri="{909E8E84-426E-40DD-AFC4-6F175D3DCCD1}">
+              <a14:hiddenFill xmlns:a14="http://schemas.microsoft.com/office/drawing/2010/main">
+                <a:solidFill>
+                  <a:srgbClr val="FFFFFF"/>
+                </a:solidFill>
+              </a14:hiddenFill>
+            </a:ext>
+          </a:extLst>
+        </p:spPr>
+      </p:pic>
+      <p:pic>
+        <p:nvPicPr>
+          <p:cNvPr id="13" name="Picture 2" descr="Rotation de la flèche vers la droite - Icônes flèches gratuites">
+            <a:extLst>
+              <a:ext uri="{FF2B5EF4-FFF2-40B4-BE49-F238E27FC236}">
+                <a16:creationId xmlns:a16="http://schemas.microsoft.com/office/drawing/2014/main" id="{9AC311B4-F3E0-A3A9-805C-CA2AFA8C80E8}"/>
+              </a:ext>
+            </a:extLst>
+          </p:cNvPr>
+          <p:cNvPicPr>
+            <a:picLocks noChangeAspect="1" noChangeArrowheads="1"/>
+          </p:cNvPicPr>
+          <p:nvPr/>
+        </p:nvPicPr>
+        <p:blipFill>
+          <a:blip r:embed="rId4">
+            <a:extLst>
+              <a:ext uri="{28A0092B-C50C-407E-A947-70E740481C1C}">
+                <a14:useLocalDpi xmlns:a14="http://schemas.microsoft.com/office/drawing/2010/main" val="0"/>
+              </a:ext>
+            </a:extLst>
+          </a:blip>
+          <a:srcRect/>
+          <a:stretch>
+            <a:fillRect/>
+          </a:stretch>
+        </p:blipFill>
+        <p:spPr bwMode="auto">
+          <a:xfrm>
+            <a:off x="8518579" y="3109140"/>
+            <a:ext cx="572418" cy="572418"/>
+          </a:xfrm>
+          <a:prstGeom prst="rect">
+            <a:avLst/>
+          </a:prstGeom>
+          <a:noFill/>
+          <a:extLst>
+            <a:ext uri="{909E8E84-426E-40DD-AFC4-6F175D3DCCD1}">
+              <a14:hiddenFill xmlns:a14="http://schemas.microsoft.com/office/drawing/2010/main">
+                <a:solidFill>
+                  <a:srgbClr val="FFFFFF"/>
+                </a:solidFill>
+              </a14:hiddenFill>
+            </a:ext>
+          </a:extLst>
+        </p:spPr>
+      </p:pic>
+      <p:sp>
+        <p:nvSpPr>
+          <p:cNvPr id="2" name="ZoneTexte 1">
+            <a:extLst>
+              <a:ext uri="{FF2B5EF4-FFF2-40B4-BE49-F238E27FC236}">
+                <a16:creationId xmlns:a16="http://schemas.microsoft.com/office/drawing/2014/main" id="{6E77F0AB-CC26-AE91-5C22-2F64FAAC7287}"/>
+              </a:ext>
+            </a:extLst>
+          </p:cNvPr>
+          <p:cNvSpPr txBox="1"/>
+          <p:nvPr/>
+        </p:nvSpPr>
+        <p:spPr>
+          <a:xfrm>
+            <a:off x="2002007" y="1233328"/>
+            <a:ext cx="853119" cy="553998"/>
+          </a:xfrm>
+          <a:prstGeom prst="rect">
+            <a:avLst/>
+          </a:prstGeom>
+          <a:noFill/>
+        </p:spPr>
+        <p:txBody>
+          <a:bodyPr wrap="none" rtlCol="0">
+            <a:spAutoFit/>
+          </a:bodyPr>
+          <a:lstStyle/>
+          <a:p>
+            <a:r>
+              <a:rPr lang="fr-FR" sz="1500" dirty="0" err="1"/>
+              <a:t>Weight</a:t>
+            </a:r>
+            <a:r>
+              <a:rPr lang="fr-FR" sz="1500" dirty="0"/>
+              <a:t> :</a:t>
+            </a:r>
+          </a:p>
+          <a:p>
+            <a:r>
+              <a:rPr lang="fr-FR" sz="1500" dirty="0"/>
+              <a:t>Data : </a:t>
+            </a:r>
+          </a:p>
+        </p:txBody>
+      </p:sp>
+      <p:sp>
+        <p:nvSpPr>
+          <p:cNvPr id="7" name="Rectangle 6">
+            <a:extLst>
+              <a:ext uri="{FF2B5EF4-FFF2-40B4-BE49-F238E27FC236}">
+                <a16:creationId xmlns:a16="http://schemas.microsoft.com/office/drawing/2014/main" id="{92FED94C-F2A9-3972-CF68-038675708365}"/>
+              </a:ext>
+            </a:extLst>
+          </p:cNvPr>
+          <p:cNvSpPr/>
+          <p:nvPr/>
+        </p:nvSpPr>
+        <p:spPr>
+          <a:xfrm>
+            <a:off x="2815192" y="1316354"/>
+            <a:ext cx="192405" cy="161925"/>
+          </a:xfrm>
+          <a:prstGeom prst="rect">
+            <a:avLst/>
+          </a:prstGeom>
+          <a:noFill/>
+          <a:ln w="9525" cap="flat" cmpd="sng" algn="ctr">
+            <a:solidFill>
+              <a:schemeClr val="dk1"/>
+            </a:solidFill>
+            <a:prstDash val="solid"/>
+            <a:round/>
+            <a:headEnd type="none" w="med" len="med"/>
+            <a:tailEnd type="none" w="med" len="med"/>
+          </a:ln>
+        </p:spPr>
+        <p:style>
+          <a:lnRef idx="0">
+            <a:scrgbClr r="0" g="0" b="0"/>
+          </a:lnRef>
+          <a:fillRef idx="0">
+            <a:scrgbClr r="0" g="0" b="0"/>
+          </a:fillRef>
+          <a:effectRef idx="0">
+            <a:scrgbClr r="0" g="0" b="0"/>
+          </a:effectRef>
+          <a:fontRef idx="minor">
+            <a:schemeClr val="dk1"/>
+          </a:fontRef>
+        </p:style>
+        <p:txBody>
+          <a:bodyPr rtlCol="0" anchor="ctr"/>
+          <a:lstStyle/>
+          <a:p>
+            <a:pPr algn="ctr"/>
+            <a:endParaRPr lang="fr-FR"/>
+          </a:p>
+        </p:txBody>
+      </p:sp>
+      <p:sp>
+        <p:nvSpPr>
+          <p:cNvPr id="12" name="Ellipse 11">
+            <a:extLst>
+              <a:ext uri="{FF2B5EF4-FFF2-40B4-BE49-F238E27FC236}">
+                <a16:creationId xmlns:a16="http://schemas.microsoft.com/office/drawing/2014/main" id="{C3C3816A-E106-821C-C03B-E19F5929865F}"/>
+              </a:ext>
+            </a:extLst>
+          </p:cNvPr>
+          <p:cNvSpPr/>
+          <p:nvPr/>
+        </p:nvSpPr>
+        <p:spPr>
+          <a:xfrm>
+            <a:off x="2659849" y="1544439"/>
+            <a:ext cx="192405" cy="161925"/>
+          </a:xfrm>
+          <a:prstGeom prst="ellipse">
+            <a:avLst/>
+          </a:prstGeom>
+          <a:noFill/>
+          <a:ln w="9525" cap="flat" cmpd="sng" algn="ctr">
+            <a:solidFill>
+              <a:schemeClr val="dk1"/>
+            </a:solidFill>
+            <a:prstDash val="solid"/>
+            <a:round/>
+            <a:headEnd type="none" w="med" len="med"/>
+            <a:tailEnd type="none" w="med" len="med"/>
+          </a:ln>
+        </p:spPr>
+        <p:style>
+          <a:lnRef idx="0">
+            <a:scrgbClr r="0" g="0" b="0"/>
+          </a:lnRef>
+          <a:fillRef idx="0">
+            <a:scrgbClr r="0" g="0" b="0"/>
+          </a:fillRef>
+          <a:effectRef idx="0">
+            <a:scrgbClr r="0" g="0" b="0"/>
+          </a:effectRef>
+          <a:fontRef idx="minor">
+            <a:schemeClr val="dk1"/>
+          </a:fontRef>
+        </p:style>
+        <p:txBody>
+          <a:bodyPr rtlCol="0" anchor="ctr"/>
+          <a:lstStyle/>
+          <a:p>
+            <a:pPr algn="ctr"/>
+            <a:endParaRPr lang="fr-FR"/>
+          </a:p>
+        </p:txBody>
+      </p:sp>
+    </p:spTree>
+    <p:extLst>
+      <p:ext uri="{BB962C8B-B14F-4D97-AF65-F5344CB8AC3E}">
+        <p14:creationId xmlns:p14="http://schemas.microsoft.com/office/powerpoint/2010/main" val="2146471016"/>
+      </p:ext>
+    </p:extLst>
+  </p:cSld>
+  <p:clrMapOvr>
+    <a:masterClrMapping/>
+  </p:clrMapOvr>
+  <mc:AlternateContent xmlns:mc="http://schemas.openxmlformats.org/markup-compatibility/2006" xmlns:p14="http://schemas.microsoft.com/office/powerpoint/2010/main">
+    <mc:Choice Requires="p14">
+      <p:transition spd="med" p14:dur="700" advClick="0" advTm="5000">
+        <p:fade/>
+      </p:transition>
+    </mc:Choice>
+    <mc:Fallback xmlns="">
+      <p:transition spd="med" advClick="0" advTm="5000">
+        <p:fade/>
+      </p:transition>
+    </mc:Fallback>
+  </mc:AlternateContent>
+  <p:timing>
+    <p:tnLst>
+      <p:par>
+        <p:cTn id="1" dur="indefinite" restart="never" nodeType="tmRoot">
+          <p:childTnLst>
+            <p:seq concurrent="1" nextAc="seek">
+              <p:cTn id="2" dur="indefinite" nodeType="mainSeq">
+                <p:childTnLst>
+                  <p:par>
+                    <p:cTn id="3" fill="hold">
+                      <p:stCondLst>
+                        <p:cond delay="indefinite"/>
+                      </p:stCondLst>
+                      <p:childTnLst>
+                        <p:par>
+                          <p:cTn id="4" fill="hold">
+                            <p:stCondLst>
+                              <p:cond delay="0"/>
+                            </p:stCondLst>
+                            <p:childTnLst>
+                              <p:par>
+                                <p:cTn id="5" presetID="10" presetClass="entr" presetSubtype="0" fill="hold" nodeType="clickEffect">
+                                  <p:stCondLst>
+                                    <p:cond delay="0"/>
+                                  </p:stCondLst>
+                                  <p:childTnLst>
+                                    <p:set>
+                                      <p:cBhvr>
+                                        <p:cTn id="6" dur="1" fill="hold">
+                                          <p:stCondLst>
+                                            <p:cond delay="0"/>
+                                          </p:stCondLst>
+                                        </p:cTn>
+                                        <p:tgtEl>
+                                          <p:spTgt spid="5122"/>
+                                        </p:tgtEl>
+                                        <p:attrNameLst>
+                                          <p:attrName>style.visibility</p:attrName>
+                                        </p:attrNameLst>
+                                      </p:cBhvr>
+                                      <p:to>
+                                        <p:strVal val="visible"/>
+                                      </p:to>
+                                    </p:set>
+                                    <p:animEffect transition="in" filter="fade">
+                                      <p:cBhvr>
+                                        <p:cTn id="7" dur="500"/>
+                                        <p:tgtEl>
+                                          <p:spTgt spid="5122"/>
+                                        </p:tgtEl>
+                                      </p:cBhvr>
+                                    </p:animEffect>
+                                  </p:childTnLst>
+                                </p:cTn>
+                              </p:par>
+                              <p:par>
+                                <p:cTn id="8" presetID="10" presetClass="entr" presetSubtype="0" fill="hold" nodeType="withEffect">
+                                  <p:stCondLst>
+                                    <p:cond delay="0"/>
+                                  </p:stCondLst>
+                                  <p:childTnLst>
+                                    <p:set>
+                                      <p:cBhvr>
+                                        <p:cTn id="9" dur="1" fill="hold">
+                                          <p:stCondLst>
+                                            <p:cond delay="0"/>
+                                          </p:stCondLst>
+                                        </p:cTn>
+                                        <p:tgtEl>
+                                          <p:spTgt spid="3"/>
+                                        </p:tgtEl>
+                                        <p:attrNameLst>
+                                          <p:attrName>style.visibility</p:attrName>
+                                        </p:attrNameLst>
+                                      </p:cBhvr>
+                                      <p:to>
+                                        <p:strVal val="visible"/>
+                                      </p:to>
+                                    </p:set>
+                                    <p:animEffect transition="in" filter="fade">
+                                      <p:cBhvr>
+                                        <p:cTn id="10" dur="500"/>
+                                        <p:tgtEl>
+                                          <p:spTgt spid="3"/>
+                                        </p:tgtEl>
+                                      </p:cBhvr>
+                                    </p:animEffect>
+                                  </p:childTnLst>
+                                </p:cTn>
+                              </p:par>
+                              <p:par>
+                                <p:cTn id="11" presetID="10" presetClass="entr" presetSubtype="0" fill="hold" nodeType="withEffect">
+                                  <p:stCondLst>
+                                    <p:cond delay="0"/>
+                                  </p:stCondLst>
+                                  <p:childTnLst>
+                                    <p:set>
+                                      <p:cBhvr>
+                                        <p:cTn id="12" dur="1" fill="hold">
+                                          <p:stCondLst>
+                                            <p:cond delay="0"/>
+                                          </p:stCondLst>
+                                        </p:cTn>
+                                        <p:tgtEl>
+                                          <p:spTgt spid="13"/>
+                                        </p:tgtEl>
+                                        <p:attrNameLst>
+                                          <p:attrName>style.visibility</p:attrName>
+                                        </p:attrNameLst>
+                                      </p:cBhvr>
+                                      <p:to>
+                                        <p:strVal val="visible"/>
+                                      </p:to>
+                                    </p:set>
+                                    <p:animEffect transition="in" filter="fade">
+                                      <p:cBhvr>
+                                        <p:cTn id="13" dur="500"/>
+                                        <p:tgtEl>
+                                          <p:spTgt spid="13"/>
+                                        </p:tgtEl>
+                                      </p:cBhvr>
+                                    </p:animEffect>
+                                  </p:childTnLst>
+                                </p:cTn>
+                              </p:par>
+                            </p:childTnLst>
+                          </p:cTn>
+                        </p:par>
+                      </p:childTnLst>
+                    </p:cTn>
+                  </p:par>
+                </p:childTnLst>
+              </p:cTn>
+              <p:prevCondLst>
+                <p:cond evt="onPrev" delay="0">
+                  <p:tgtEl>
+                    <p:sldTgt/>
+                  </p:tgtEl>
+                </p:cond>
+              </p:prevCondLst>
+              <p:nextCondLst>
+                <p:cond evt="onNext" delay="0">
+                  <p:tgtEl>
+                    <p:sldTgt/>
+                  </p:tgtEl>
+                </p:cond>
+              </p:nextCondLst>
+            </p:seq>
+          </p:childTnLst>
+        </p:cTn>
+      </p:par>
+    </p:tnLst>
   </p:timing>
 </p:sld>
 </file>
@@ -16318,13 +17556,13 @@
   <p:clrMapOvr>
     <a:masterClrMapping/>
   </p:clrMapOvr>
-  <mc:AlternateContent xmlns:mc="http://schemas.openxmlformats.org/markup-compatibility/2006">
-    <mc:Choice xmlns:p14="http://schemas.microsoft.com/office/powerpoint/2010/main" Requires="p14">
+  <mc:AlternateContent xmlns:mc="http://schemas.openxmlformats.org/markup-compatibility/2006" xmlns:p14="http://schemas.microsoft.com/office/powerpoint/2010/main">
+    <mc:Choice Requires="p14">
       <p:transition spd="med" p14:dur="700" advClick="0" advTm="14000">
         <p:fade/>
       </p:transition>
     </mc:Choice>
-    <mc:Fallback>
+    <mc:Fallback xmlns="">
       <p:transition spd="med" advClick="0" advTm="14000">
         <p:fade/>
       </p:transition>

</xml_diff>